<commit_message>
updates to shadow slides
</commit_message>
<xml_diff>
--- a/computer-graphics-js-2.pptx
+++ b/computer-graphics-js-2.pptx
@@ -201,7 +201,7 @@
           <a:p>
             <a:fld id="{1C68982D-E66A-4CC9-8D60-F3452BA7A398}" type="datetimeFigureOut">
               <a:rPr lang="en-US" smtClean="0"/>
-              <a:t>3/31/2021</a:t>
+              <a:t>4/7/2021</a:t>
             </a:fld>
             <a:endParaRPr lang="en-US"/>
           </a:p>
@@ -783,7 +783,7 @@
           <a:p>
             <a:fld id="{8FA5496C-C728-456A-977F-D9196E097204}" type="datetime1">
               <a:rPr lang="en-US" smtClean="0"/>
-              <a:t>3/31/2021</a:t>
+              <a:t>4/7/2021</a:t>
             </a:fld>
             <a:endParaRPr lang="en-US"/>
           </a:p>
@@ -984,7 +984,7 @@
           <a:p>
             <a:fld id="{334FE89A-4755-42FC-8111-20439C1F0FC8}" type="datetime1">
               <a:rPr lang="en-US" smtClean="0"/>
-              <a:t>3/31/2021</a:t>
+              <a:t>4/7/2021</a:t>
             </a:fld>
             <a:endParaRPr lang="en-US"/>
           </a:p>
@@ -1195,7 +1195,7 @@
           <a:p>
             <a:fld id="{5C5E400F-89D0-46D1-9B46-371CDED5800F}" type="datetime1">
               <a:rPr lang="en-US" smtClean="0"/>
-              <a:t>3/31/2021</a:t>
+              <a:t>4/7/2021</a:t>
             </a:fld>
             <a:endParaRPr lang="en-US"/>
           </a:p>
@@ -1396,7 +1396,7 @@
           <a:p>
             <a:fld id="{82BCD581-7540-41CB-8BBB-BEC98AE789ED}" type="datetime1">
               <a:rPr lang="en-US" smtClean="0"/>
-              <a:t>3/31/2021</a:t>
+              <a:t>4/7/2021</a:t>
             </a:fld>
             <a:endParaRPr lang="en-US"/>
           </a:p>
@@ -1674,7 +1674,7 @@
           <a:p>
             <a:fld id="{FE716A51-E2A8-46FD-9E85-91012295338D}" type="datetime1">
               <a:rPr lang="en-US" smtClean="0"/>
-              <a:t>3/31/2021</a:t>
+              <a:t>4/7/2021</a:t>
             </a:fld>
             <a:endParaRPr lang="en-US"/>
           </a:p>
@@ -1942,7 +1942,7 @@
           <a:p>
             <a:fld id="{725D7A7C-FF76-48E2-AFCE-76270FDC0A73}" type="datetime1">
               <a:rPr lang="en-US" smtClean="0"/>
-              <a:t>3/31/2021</a:t>
+              <a:t>4/7/2021</a:t>
             </a:fld>
             <a:endParaRPr lang="en-US"/>
           </a:p>
@@ -2357,7 +2357,7 @@
           <a:p>
             <a:fld id="{8CBA4743-8874-4114-AF63-FA0AC80D7895}" type="datetime1">
               <a:rPr lang="en-US" smtClean="0"/>
-              <a:t>3/31/2021</a:t>
+              <a:t>4/7/2021</a:t>
             </a:fld>
             <a:endParaRPr lang="en-US"/>
           </a:p>
@@ -2501,7 +2501,7 @@
           <a:p>
             <a:fld id="{9064E9D3-DC0A-4ABC-9213-50B3983CCD13}" type="datetime1">
               <a:rPr lang="en-US" smtClean="0"/>
-              <a:t>3/31/2021</a:t>
+              <a:t>4/7/2021</a:t>
             </a:fld>
             <a:endParaRPr lang="en-US"/>
           </a:p>
@@ -2617,7 +2617,7 @@
           <a:p>
             <a:fld id="{332F517D-9C77-4CA9-A25F-12287C96135E}" type="datetime1">
               <a:rPr lang="en-US" smtClean="0"/>
-              <a:t>3/31/2021</a:t>
+              <a:t>4/7/2021</a:t>
             </a:fld>
             <a:endParaRPr lang="en-US"/>
           </a:p>
@@ -2931,7 +2931,7 @@
           <a:p>
             <a:fld id="{E5B3C226-B550-4C7D-A05F-07AA9FF43E24}" type="datetime1">
               <a:rPr lang="en-US" smtClean="0"/>
-              <a:t>3/31/2021</a:t>
+              <a:t>4/7/2021</a:t>
             </a:fld>
             <a:endParaRPr lang="en-US"/>
           </a:p>
@@ -3222,7 +3222,7 @@
           <a:p>
             <a:fld id="{46EE6C59-4282-4A86-BEDA-6EBC9A482A2D}" type="datetime1">
               <a:rPr lang="en-US" smtClean="0"/>
-              <a:t>3/31/2021</a:t>
+              <a:t>4/7/2021</a:t>
             </a:fld>
             <a:endParaRPr lang="en-US"/>
           </a:p>
@@ -3466,7 +3466,7 @@
           <a:p>
             <a:fld id="{A7700EF3-3C29-4744-8EE4-CE5D48A4A04B}" type="datetime1">
               <a:rPr lang="en-US" smtClean="0"/>
-              <a:t>3/31/2021</a:t>
+              <a:t>4/7/2021</a:t>
             </a:fld>
             <a:endParaRPr lang="en-US"/>
           </a:p>
@@ -4241,7 +4241,7 @@
                   <a:spcPts val="600"/>
                 </a:spcAft>
               </a:pPr>
-              <a:t>3/31/2021</a:t>
+              <a:t>4/7/2021</a:t>
             </a:fld>
             <a:endParaRPr lang="en-US" sz="1100">
               <a:solidFill>
@@ -4478,7 +4478,7 @@
           <a:p>
             <a:fld id="{82BCD581-7540-41CB-8BBB-BEC98AE789ED}" type="datetime1">
               <a:rPr lang="en-US" smtClean="0"/>
-              <a:t>3/31/2021</a:t>
+              <a:t>4/7/2021</a:t>
             </a:fld>
             <a:endParaRPr lang="en-US"/>
           </a:p>
@@ -4634,7 +4634,7 @@
           <a:p>
             <a:fld id="{82BCD581-7540-41CB-8BBB-BEC98AE789ED}" type="datetime1">
               <a:rPr lang="en-US" smtClean="0"/>
-              <a:t>3/31/2021</a:t>
+              <a:t>4/7/2021</a:t>
             </a:fld>
             <a:endParaRPr lang="en-US" dirty="0"/>
           </a:p>
@@ -4692,7 +4692,7 @@
         </p:spPr>
         <p:txBody>
           <a:bodyPr>
-            <a:normAutofit/>
+            <a:normAutofit lnSpcReduction="10000"/>
           </a:bodyPr>
           <a:lstStyle/>
           <a:p>
@@ -4786,7 +4786,13 @@
               <a:rPr lang="en-US" sz="1800" dirty="0">
                 <a:latin typeface="+mj-lt"/>
               </a:rPr>
-              <a:t>()` but instead: </a:t>
+              <a:t>()` but instead </a:t>
+            </a:r>
+            <a:r>
+              <a:rPr lang="en-US" sz="1800" b="1" dirty="0">
+                <a:latin typeface="+mj-lt"/>
+              </a:rPr>
+              <a:t>L</a:t>
             </a:r>
           </a:p>
           <a:p>
@@ -4798,7 +4804,31 @@
               <a:rPr lang="en-US" sz="1800" dirty="0">
                 <a:latin typeface="+mj-lt"/>
               </a:rPr>
-              <a:t>To prevent shadows behind this point from overlapping, we set </a:t>
+              <a:t>An object behind P should not cast a shadow over it, so </a:t>
+            </a:r>
+          </a:p>
+          <a:p>
+            <a:pPr marL="457200" indent="-457200">
+              <a:buFont typeface="+mj-lt"/>
+              <a:buAutoNum type="arabicPeriod"/>
+            </a:pPr>
+            <a:r>
+              <a:rPr lang="en-US" sz="1800" dirty="0">
+                <a:latin typeface="+mj-lt"/>
+              </a:rPr>
+              <a:t>A very distant object should still cast a shadow, so </a:t>
+            </a:r>
+            <a:r>
+              <a:rPr lang="en-US" sz="1800" i="1" dirty="0">
+                <a:latin typeface="+mj-lt"/>
+              </a:rPr>
+              <a:t>t</a:t>
+            </a:r>
+            <a:r>
+              <a:rPr lang="en-US" sz="1800" dirty="0">
+                <a:latin typeface="+mj-lt"/>
+              </a:rPr>
+              <a:t> will go to positive infinity.</a:t>
             </a:r>
           </a:p>
           <a:p>
@@ -5039,7 +5069,7 @@
           <a:p>
             <a:fld id="{82BCD581-7540-41CB-8BBB-BEC98AE789ED}" type="datetime1">
               <a:rPr lang="en-US" smtClean="0"/>
-              <a:t>3/31/2021</a:t>
+              <a:t>4/7/2021</a:t>
             </a:fld>
             <a:endParaRPr lang="en-US" dirty="0"/>
           </a:p>
@@ -5274,7 +5304,7 @@
           <a:p>
             <a:fld id="{8FA5496C-C728-456A-977F-D9196E097204}" type="datetime1">
               <a:rPr lang="en-US" smtClean="0"/>
-              <a:t>3/31/2021</a:t>
+              <a:t>4/7/2021</a:t>
             </a:fld>
             <a:endParaRPr lang="en-US" dirty="0"/>
           </a:p>

</xml_diff>

<commit_message>
finish ppt slide deck, updated code to include new raytrace methods, reflections, shadows
</commit_message>
<xml_diff>
--- a/computer-graphics-js-2.pptx
+++ b/computer-graphics-js-2.pptx
@@ -5,14 +5,19 @@
     <p:sldMasterId id="2147483648" r:id="rId1"/>
   </p:sldMasterIdLst>
   <p:notesMasterIdLst>
-    <p:notesMasterId r:id="rId7"/>
+    <p:notesMasterId r:id="rId12"/>
   </p:notesMasterIdLst>
   <p:sldIdLst>
     <p:sldId id="256" r:id="rId2"/>
     <p:sldId id="257" r:id="rId3"/>
     <p:sldId id="266" r:id="rId4"/>
-    <p:sldId id="268" r:id="rId5"/>
-    <p:sldId id="271" r:id="rId6"/>
+    <p:sldId id="272" r:id="rId5"/>
+    <p:sldId id="268" r:id="rId6"/>
+    <p:sldId id="273" r:id="rId7"/>
+    <p:sldId id="274" r:id="rId8"/>
+    <p:sldId id="275" r:id="rId9"/>
+    <p:sldId id="276" r:id="rId10"/>
+    <p:sldId id="271" r:id="rId11"/>
   </p:sldIdLst>
   <p:sldSz cx="12192000" cy="6858000"/>
   <p:notesSz cx="6858000" cy="9144000"/>
@@ -201,7 +206,7 @@
           <a:p>
             <a:fld id="{1C68982D-E66A-4CC9-8D60-F3452BA7A398}" type="datetimeFigureOut">
               <a:rPr lang="en-US" smtClean="0"/>
-              <a:t>4/7/2021</a:t>
+              <a:t>4/14/2021</a:t>
             </a:fld>
             <a:endParaRPr lang="en-US"/>
           </a:p>
@@ -626,7 +631,175 @@
     </p:spTree>
     <p:extLst>
       <p:ext uri="{BB962C8B-B14F-4D97-AF65-F5344CB8AC3E}">
+        <p14:creationId xmlns:p14="http://schemas.microsoft.com/office/powerpoint/2010/main" val="443464560"/>
+      </p:ext>
+    </p:extLst>
+  </p:cSld>
+  <p:clrMapOvr>
+    <a:masterClrMapping/>
+  </p:clrMapOvr>
+</p:notes>
+</file>
+
+<file path=ppt/notesSlides/notesSlide3.xml><?xml version="1.0" encoding="utf-8"?>
+<p:notes xmlns:a="http://schemas.openxmlformats.org/drawingml/2006/main" xmlns:r="http://schemas.openxmlformats.org/officeDocument/2006/relationships" xmlns:p="http://schemas.openxmlformats.org/presentationml/2006/main">
+  <p:cSld>
+    <p:spTree>
+      <p:nvGrpSpPr>
+        <p:cNvPr id="1" name=""/>
+        <p:cNvGrpSpPr/>
+        <p:nvPr/>
+      </p:nvGrpSpPr>
+      <p:grpSpPr>
+        <a:xfrm>
+          <a:off x="0" y="0"/>
+          <a:ext cx="0" cy="0"/>
+          <a:chOff x="0" y="0"/>
+          <a:chExt cx="0" cy="0"/>
+        </a:xfrm>
+      </p:grpSpPr>
+      <p:sp>
+        <p:nvSpPr>
+          <p:cNvPr id="2" name="Slide Image Placeholder 1"/>
+          <p:cNvSpPr>
+            <a:spLocks noGrp="1" noRot="1" noChangeAspect="1"/>
+          </p:cNvSpPr>
+          <p:nvPr>
+            <p:ph type="sldImg"/>
+          </p:nvPr>
+        </p:nvSpPr>
+        <p:spPr/>
+      </p:sp>
+      <p:sp>
+        <p:nvSpPr>
+          <p:cNvPr id="3" name="Notes Placeholder 2"/>
+          <p:cNvSpPr>
+            <a:spLocks noGrp="1"/>
+          </p:cNvSpPr>
+          <p:nvPr>
+            <p:ph type="body" idx="1"/>
+          </p:nvPr>
+        </p:nvSpPr>
+        <p:spPr/>
+        <p:txBody>
+          <a:bodyPr/>
+          <a:lstStyle/>
+          <a:p>
+            <a:endParaRPr lang="en-US" dirty="0"/>
+          </a:p>
+        </p:txBody>
+      </p:sp>
+      <p:sp>
+        <p:nvSpPr>
+          <p:cNvPr id="4" name="Slide Number Placeholder 3"/>
+          <p:cNvSpPr>
+            <a:spLocks noGrp="1"/>
+          </p:cNvSpPr>
+          <p:nvPr>
+            <p:ph type="sldNum" sz="quarter" idx="5"/>
+          </p:nvPr>
+        </p:nvSpPr>
+        <p:spPr/>
+        <p:txBody>
+          <a:bodyPr/>
+          <a:lstStyle/>
+          <a:p>
+            <a:fld id="{68D67263-86F8-4041-922D-D14F3EA6CAA4}" type="slidenum">
+              <a:rPr lang="en-US" smtClean="0"/>
+              <a:t>5</a:t>
+            </a:fld>
+            <a:endParaRPr lang="en-US"/>
+          </a:p>
+        </p:txBody>
+      </p:sp>
+    </p:spTree>
+    <p:extLst>
+      <p:ext uri="{BB962C8B-B14F-4D97-AF65-F5344CB8AC3E}">
         <p14:creationId xmlns:p14="http://schemas.microsoft.com/office/powerpoint/2010/main" val="2812279566"/>
+      </p:ext>
+    </p:extLst>
+  </p:cSld>
+  <p:clrMapOvr>
+    <a:masterClrMapping/>
+  </p:clrMapOvr>
+</p:notes>
+</file>
+
+<file path=ppt/notesSlides/notesSlide4.xml><?xml version="1.0" encoding="utf-8"?>
+<p:notes xmlns:a="http://schemas.openxmlformats.org/drawingml/2006/main" xmlns:r="http://schemas.openxmlformats.org/officeDocument/2006/relationships" xmlns:p="http://schemas.openxmlformats.org/presentationml/2006/main">
+  <p:cSld>
+    <p:spTree>
+      <p:nvGrpSpPr>
+        <p:cNvPr id="1" name=""/>
+        <p:cNvGrpSpPr/>
+        <p:nvPr/>
+      </p:nvGrpSpPr>
+      <p:grpSpPr>
+        <a:xfrm>
+          <a:off x="0" y="0"/>
+          <a:ext cx="0" cy="0"/>
+          <a:chOff x="0" y="0"/>
+          <a:chExt cx="0" cy="0"/>
+        </a:xfrm>
+      </p:grpSpPr>
+      <p:sp>
+        <p:nvSpPr>
+          <p:cNvPr id="2" name="Slide Image Placeholder 1"/>
+          <p:cNvSpPr>
+            <a:spLocks noGrp="1" noRot="1" noChangeAspect="1"/>
+          </p:cNvSpPr>
+          <p:nvPr>
+            <p:ph type="sldImg"/>
+          </p:nvPr>
+        </p:nvSpPr>
+        <p:spPr/>
+      </p:sp>
+      <p:sp>
+        <p:nvSpPr>
+          <p:cNvPr id="3" name="Notes Placeholder 2"/>
+          <p:cNvSpPr>
+            <a:spLocks noGrp="1"/>
+          </p:cNvSpPr>
+          <p:nvPr>
+            <p:ph type="body" idx="1"/>
+          </p:nvPr>
+        </p:nvSpPr>
+        <p:spPr/>
+        <p:txBody>
+          <a:bodyPr/>
+          <a:lstStyle/>
+          <a:p>
+            <a:endParaRPr lang="en-US" dirty="0"/>
+          </a:p>
+        </p:txBody>
+      </p:sp>
+      <p:sp>
+        <p:nvSpPr>
+          <p:cNvPr id="4" name="Slide Number Placeholder 3"/>
+          <p:cNvSpPr>
+            <a:spLocks noGrp="1"/>
+          </p:cNvSpPr>
+          <p:nvPr>
+            <p:ph type="sldNum" sz="quarter" idx="5"/>
+          </p:nvPr>
+        </p:nvSpPr>
+        <p:spPr/>
+        <p:txBody>
+          <a:bodyPr/>
+          <a:lstStyle/>
+          <a:p>
+            <a:fld id="{68D67263-86F8-4041-922D-D14F3EA6CAA4}" type="slidenum">
+              <a:rPr lang="en-US" smtClean="0"/>
+              <a:t>9</a:t>
+            </a:fld>
+            <a:endParaRPr lang="en-US"/>
+          </a:p>
+        </p:txBody>
+      </p:sp>
+    </p:spTree>
+    <p:extLst>
+      <p:ext uri="{BB962C8B-B14F-4D97-AF65-F5344CB8AC3E}">
+        <p14:creationId xmlns:p14="http://schemas.microsoft.com/office/powerpoint/2010/main" val="621075957"/>
       </p:ext>
     </p:extLst>
   </p:cSld>
@@ -783,7 +956,7 @@
           <a:p>
             <a:fld id="{8FA5496C-C728-456A-977F-D9196E097204}" type="datetime1">
               <a:rPr lang="en-US" smtClean="0"/>
-              <a:t>4/7/2021</a:t>
+              <a:t>4/14/2021</a:t>
             </a:fld>
             <a:endParaRPr lang="en-US"/>
           </a:p>
@@ -984,7 +1157,7 @@
           <a:p>
             <a:fld id="{334FE89A-4755-42FC-8111-20439C1F0FC8}" type="datetime1">
               <a:rPr lang="en-US" smtClean="0"/>
-              <a:t>4/7/2021</a:t>
+              <a:t>4/14/2021</a:t>
             </a:fld>
             <a:endParaRPr lang="en-US"/>
           </a:p>
@@ -1195,7 +1368,7 @@
           <a:p>
             <a:fld id="{5C5E400F-89D0-46D1-9B46-371CDED5800F}" type="datetime1">
               <a:rPr lang="en-US" smtClean="0"/>
-              <a:t>4/7/2021</a:t>
+              <a:t>4/14/2021</a:t>
             </a:fld>
             <a:endParaRPr lang="en-US"/>
           </a:p>
@@ -1396,7 +1569,7 @@
           <a:p>
             <a:fld id="{82BCD581-7540-41CB-8BBB-BEC98AE789ED}" type="datetime1">
               <a:rPr lang="en-US" smtClean="0"/>
-              <a:t>4/7/2021</a:t>
+              <a:t>4/14/2021</a:t>
             </a:fld>
             <a:endParaRPr lang="en-US"/>
           </a:p>
@@ -1674,7 +1847,7 @@
           <a:p>
             <a:fld id="{FE716A51-E2A8-46FD-9E85-91012295338D}" type="datetime1">
               <a:rPr lang="en-US" smtClean="0"/>
-              <a:t>4/7/2021</a:t>
+              <a:t>4/14/2021</a:t>
             </a:fld>
             <a:endParaRPr lang="en-US"/>
           </a:p>
@@ -1942,7 +2115,7 @@
           <a:p>
             <a:fld id="{725D7A7C-FF76-48E2-AFCE-76270FDC0A73}" type="datetime1">
               <a:rPr lang="en-US" smtClean="0"/>
-              <a:t>4/7/2021</a:t>
+              <a:t>4/14/2021</a:t>
             </a:fld>
             <a:endParaRPr lang="en-US"/>
           </a:p>
@@ -2357,7 +2530,7 @@
           <a:p>
             <a:fld id="{8CBA4743-8874-4114-AF63-FA0AC80D7895}" type="datetime1">
               <a:rPr lang="en-US" smtClean="0"/>
-              <a:t>4/7/2021</a:t>
+              <a:t>4/14/2021</a:t>
             </a:fld>
             <a:endParaRPr lang="en-US"/>
           </a:p>
@@ -2501,7 +2674,7 @@
           <a:p>
             <a:fld id="{9064E9D3-DC0A-4ABC-9213-50B3983CCD13}" type="datetime1">
               <a:rPr lang="en-US" smtClean="0"/>
-              <a:t>4/7/2021</a:t>
+              <a:t>4/14/2021</a:t>
             </a:fld>
             <a:endParaRPr lang="en-US"/>
           </a:p>
@@ -2617,7 +2790,7 @@
           <a:p>
             <a:fld id="{332F517D-9C77-4CA9-A25F-12287C96135E}" type="datetime1">
               <a:rPr lang="en-US" smtClean="0"/>
-              <a:t>4/7/2021</a:t>
+              <a:t>4/14/2021</a:t>
             </a:fld>
             <a:endParaRPr lang="en-US"/>
           </a:p>
@@ -2931,7 +3104,7 @@
           <a:p>
             <a:fld id="{E5B3C226-B550-4C7D-A05F-07AA9FF43E24}" type="datetime1">
               <a:rPr lang="en-US" smtClean="0"/>
-              <a:t>4/7/2021</a:t>
+              <a:t>4/14/2021</a:t>
             </a:fld>
             <a:endParaRPr lang="en-US"/>
           </a:p>
@@ -3222,7 +3395,7 @@
           <a:p>
             <a:fld id="{46EE6C59-4282-4A86-BEDA-6EBC9A482A2D}" type="datetime1">
               <a:rPr lang="en-US" smtClean="0"/>
-              <a:t>4/7/2021</a:t>
+              <a:t>4/14/2021</a:t>
             </a:fld>
             <a:endParaRPr lang="en-US"/>
           </a:p>
@@ -3466,7 +3639,7 @@
           <a:p>
             <a:fld id="{A7700EF3-3C29-4744-8EE4-CE5D48A4A04B}" type="datetime1">
               <a:rPr lang="en-US" smtClean="0"/>
-              <a:t>4/7/2021</a:t>
+              <a:t>4/14/2021</a:t>
             </a:fld>
             <a:endParaRPr lang="en-US"/>
           </a:p>
@@ -4241,7 +4414,7 @@
                   <a:spcPts val="600"/>
                 </a:spcAft>
               </a:pPr>
-              <a:t>4/7/2021</a:t>
+              <a:t>4/14/2021</a:t>
             </a:fld>
             <a:endParaRPr lang="en-US" sz="1100">
               <a:solidFill>
@@ -4308,6 +4481,190 @@
   </p:cSld>
   <p:clrMapOvr>
     <a:overrideClrMapping bg1="dk1" tx1="lt1" bg2="dk2" tx2="lt2" accent1="accent1" accent2="accent2" accent3="accent3" accent4="accent4" accent5="accent5" accent6="accent6" hlink="hlink" folHlink="folHlink"/>
+  </p:clrMapOvr>
+</p:sld>
+</file>
+
+<file path=ppt/slides/slide10.xml><?xml version="1.0" encoding="utf-8"?>
+<p:sld xmlns:a="http://schemas.openxmlformats.org/drawingml/2006/main" xmlns:r="http://schemas.openxmlformats.org/officeDocument/2006/relationships" xmlns:p="http://schemas.openxmlformats.org/presentationml/2006/main">
+  <p:cSld>
+    <p:spTree>
+      <p:nvGrpSpPr>
+        <p:cNvPr id="1" name=""/>
+        <p:cNvGrpSpPr/>
+        <p:nvPr/>
+      </p:nvGrpSpPr>
+      <p:grpSpPr>
+        <a:xfrm>
+          <a:off x="0" y="0"/>
+          <a:ext cx="0" cy="0"/>
+          <a:chOff x="0" y="0"/>
+          <a:chExt cx="0" cy="0"/>
+        </a:xfrm>
+      </p:grpSpPr>
+      <p:sp>
+        <p:nvSpPr>
+          <p:cNvPr id="2" name="Title 1">
+            <a:extLst>
+              <a:ext uri="{FF2B5EF4-FFF2-40B4-BE49-F238E27FC236}">
+                <a16:creationId xmlns:a16="http://schemas.microsoft.com/office/drawing/2014/main" id="{CFD2A866-64A4-42F7-8809-D9FDB61CC407}"/>
+              </a:ext>
+            </a:extLst>
+          </p:cNvPr>
+          <p:cNvSpPr>
+            <a:spLocks noGrp="1"/>
+          </p:cNvSpPr>
+          <p:nvPr>
+            <p:ph type="ctrTitle"/>
+          </p:nvPr>
+        </p:nvSpPr>
+        <p:spPr/>
+        <p:txBody>
+          <a:bodyPr/>
+          <a:lstStyle/>
+          <a:p>
+            <a:r>
+              <a:rPr lang="en-US" dirty="0"/>
+              <a:t>Sources:</a:t>
+            </a:r>
+          </a:p>
+        </p:txBody>
+      </p:sp>
+      <p:sp>
+        <p:nvSpPr>
+          <p:cNvPr id="3" name="Subtitle 2">
+            <a:extLst>
+              <a:ext uri="{FF2B5EF4-FFF2-40B4-BE49-F238E27FC236}">
+                <a16:creationId xmlns:a16="http://schemas.microsoft.com/office/drawing/2014/main" id="{F26D0D6E-5592-4855-A460-F9EDDCBAE0B7}"/>
+              </a:ext>
+            </a:extLst>
+          </p:cNvPr>
+          <p:cNvSpPr>
+            <a:spLocks noGrp="1"/>
+          </p:cNvSpPr>
+          <p:nvPr>
+            <p:ph type="subTitle" idx="1"/>
+          </p:nvPr>
+        </p:nvSpPr>
+        <p:spPr>
+          <a:xfrm>
+            <a:off x="1088571" y="3577156"/>
+            <a:ext cx="10014857" cy="1655762"/>
+          </a:xfrm>
+        </p:spPr>
+        <p:txBody>
+          <a:bodyPr>
+            <a:normAutofit fontScale="92500"/>
+          </a:bodyPr>
+          <a:lstStyle/>
+          <a:p>
+            <a:r>
+              <a:rPr lang="en-US" dirty="0" err="1"/>
+              <a:t>Github</a:t>
+            </a:r>
+            <a:r>
+              <a:rPr lang="en-US" dirty="0"/>
+              <a:t> for this Demo: </a:t>
+            </a:r>
+            <a:r>
+              <a:rPr lang="en-US" dirty="0">
+                <a:hlinkClick r:id="rId2"/>
+              </a:rPr>
+              <a:t>https://github.com/ctrachte/JS-Computer-Graphics-Demo</a:t>
+            </a:r>
+            <a:endParaRPr lang="en-US" dirty="0"/>
+          </a:p>
+          <a:p>
+            <a:br>
+              <a:rPr lang="en-US" dirty="0"/>
+            </a:br>
+            <a:r>
+              <a:rPr lang="en-US" dirty="0"/>
+              <a:t>Gambetta, Gabriel. </a:t>
+            </a:r>
+            <a:r>
+              <a:rPr lang="en-US" i="1" dirty="0"/>
+              <a:t>“Computer Graphics from Scratch”. Web, 2021. </a:t>
+            </a:r>
+            <a:r>
+              <a:rPr lang="en-US" i="1" dirty="0">
+                <a:hlinkClick r:id="rId3"/>
+              </a:rPr>
+              <a:t>https://gabrielgambetta.com/computer-graphics-from-scratch/</a:t>
+            </a:r>
+            <a:endParaRPr lang="en-US" i="1" dirty="0"/>
+          </a:p>
+          <a:p>
+            <a:endParaRPr lang="en-US" i="1" dirty="0"/>
+          </a:p>
+        </p:txBody>
+      </p:sp>
+      <p:sp>
+        <p:nvSpPr>
+          <p:cNvPr id="4" name="Date Placeholder 3">
+            <a:extLst>
+              <a:ext uri="{FF2B5EF4-FFF2-40B4-BE49-F238E27FC236}">
+                <a16:creationId xmlns:a16="http://schemas.microsoft.com/office/drawing/2014/main" id="{C5B7EC2F-572A-4A58-A93B-226C493EA37E}"/>
+              </a:ext>
+            </a:extLst>
+          </p:cNvPr>
+          <p:cNvSpPr>
+            <a:spLocks noGrp="1"/>
+          </p:cNvSpPr>
+          <p:nvPr>
+            <p:ph type="dt" sz="half" idx="10"/>
+          </p:nvPr>
+        </p:nvSpPr>
+        <p:spPr/>
+        <p:txBody>
+          <a:bodyPr/>
+          <a:lstStyle/>
+          <a:p>
+            <a:fld id="{8FA5496C-C728-456A-977F-D9196E097204}" type="datetime1">
+              <a:rPr lang="en-US" smtClean="0"/>
+              <a:t>4/14/2021</a:t>
+            </a:fld>
+            <a:endParaRPr lang="en-US" dirty="0"/>
+          </a:p>
+        </p:txBody>
+      </p:sp>
+      <p:sp>
+        <p:nvSpPr>
+          <p:cNvPr id="5" name="Footer Placeholder 4">
+            <a:extLst>
+              <a:ext uri="{FF2B5EF4-FFF2-40B4-BE49-F238E27FC236}">
+                <a16:creationId xmlns:a16="http://schemas.microsoft.com/office/drawing/2014/main" id="{B13EE22C-5F84-4EBE-8293-449C3CCF7746}"/>
+              </a:ext>
+            </a:extLst>
+          </p:cNvPr>
+          <p:cNvSpPr>
+            <a:spLocks noGrp="1"/>
+          </p:cNvSpPr>
+          <p:nvPr>
+            <p:ph type="ftr" sz="quarter" idx="11"/>
+          </p:nvPr>
+        </p:nvSpPr>
+        <p:spPr/>
+        <p:txBody>
+          <a:bodyPr/>
+          <a:lstStyle/>
+          <a:p>
+            <a:r>
+              <a:rPr lang="en-US"/>
+              <a:t>Gambetta, Gabriel. 2021, Computer Graphics from Scratch</a:t>
+            </a:r>
+          </a:p>
+        </p:txBody>
+      </p:sp>
+    </p:spTree>
+    <p:extLst>
+      <p:ext uri="{BB962C8B-B14F-4D97-AF65-F5344CB8AC3E}">
+        <p14:creationId xmlns:p14="http://schemas.microsoft.com/office/powerpoint/2010/main" val="3385567051"/>
+      </p:ext>
+    </p:extLst>
+  </p:cSld>
+  <p:clrMapOvr>
+    <a:masterClrMapping/>
   </p:clrMapOvr>
 </p:sld>
 </file>
@@ -4478,7 +4835,7 @@
           <a:p>
             <a:fld id="{82BCD581-7540-41CB-8BBB-BEC98AE789ED}" type="datetime1">
               <a:rPr lang="en-US" smtClean="0"/>
-              <a:t>4/7/2021</a:t>
+              <a:t>4/14/2021</a:t>
             </a:fld>
             <a:endParaRPr lang="en-US"/>
           </a:p>
@@ -4634,7 +4991,7 @@
           <a:p>
             <a:fld id="{82BCD581-7540-41CB-8BBB-BEC98AE789ED}" type="datetime1">
               <a:rPr lang="en-US" smtClean="0"/>
-              <a:t>4/7/2021</a:t>
+              <a:t>4/14/2021</a:t>
             </a:fld>
             <a:endParaRPr lang="en-US" dirty="0"/>
           </a:p>
@@ -4977,6 +5334,42 @@
           <a:xfrm>
             <a:off x="5523722" y="1986006"/>
             <a:ext cx="6292103" cy="3162252"/>
+          </a:xfrm>
+          <a:prstGeom prst="rect">
+            <a:avLst/>
+          </a:prstGeom>
+        </p:spPr>
+      </p:pic>
+      <p:pic>
+        <p:nvPicPr>
+          <p:cNvPr id="8" name="Picture 7">
+            <a:extLst>
+              <a:ext uri="{FF2B5EF4-FFF2-40B4-BE49-F238E27FC236}">
+                <a16:creationId xmlns:a16="http://schemas.microsoft.com/office/drawing/2014/main" id="{63755B2E-2023-4FF2-BB25-E0E39A043DE5}"/>
+              </a:ext>
+            </a:extLst>
+          </p:cNvPr>
+          <p:cNvPicPr>
+            <a:picLocks noChangeAspect="1"/>
+          </p:cNvPicPr>
+          <p:nvPr/>
+        </p:nvPicPr>
+        <p:blipFill>
+          <a:blip r:embed="rId6">
+            <a:extLst>
+              <a:ext uri="{28A0092B-C50C-407E-A947-70E740481C1C}">
+                <a14:useLocalDpi xmlns:a14="http://schemas.microsoft.com/office/drawing/2010/main" val="0"/>
+              </a:ext>
+            </a:extLst>
+          </a:blip>
+          <a:stretch>
+            <a:fillRect/>
+          </a:stretch>
+        </p:blipFill>
+        <p:spPr>
+          <a:xfrm>
+            <a:off x="3175758" y="4837619"/>
+            <a:ext cx="724001" cy="181000"/>
           </a:xfrm>
           <a:prstGeom prst="rect">
             <a:avLst/>
@@ -5036,7 +5429,7 @@
           <a:p>
             <a:r>
               <a:rPr lang="en-US" dirty="0"/>
-              <a:t>Recap/Summary</a:t>
+              <a:t>Adding Shadows </a:t>
             </a:r>
           </a:p>
         </p:txBody>
@@ -5069,7 +5462,7 @@
           <a:p>
             <a:fld id="{82BCD581-7540-41CB-8BBB-BEC98AE789ED}" type="datetime1">
               <a:rPr lang="en-US" smtClean="0"/>
-              <a:t>4/7/2021</a:t>
+              <a:t>4/14/2021</a:t>
             </a:fld>
             <a:endParaRPr lang="en-US" dirty="0"/>
           </a:p>
@@ -5121,8 +5514,8 @@
         </p:nvSpPr>
         <p:spPr>
           <a:xfrm>
-            <a:off x="838200" y="1690688"/>
-            <a:ext cx="10464282" cy="4665662"/>
+            <a:off x="838200" y="1690687"/>
+            <a:ext cx="4685522" cy="4305785"/>
           </a:xfrm>
         </p:spPr>
         <p:txBody>
@@ -5135,10 +5528,10 @@
               <a:buNone/>
             </a:pPr>
             <a:r>
-              <a:rPr lang="en-US" sz="2000" b="1" dirty="0">
+              <a:rPr lang="en-US" sz="2000" dirty="0">
                 <a:latin typeface="+mj-lt"/>
               </a:rPr>
-              <a:t>We have formulas that:</a:t>
+              <a:t>Our light vector L is not constant, but we can compute it from point P to </a:t>
             </a:r>
           </a:p>
           <a:p>
@@ -5146,18 +5539,227 @@
               <a:buNone/>
             </a:pPr>
             <a:r>
-              <a:rPr lang="en-US" sz="2000" b="1" dirty="0">
+              <a:rPr lang="en-US" sz="2000" dirty="0">
                 <a:latin typeface="+mj-lt"/>
               </a:rPr>
-              <a:t>We need to:</a:t>
-            </a:r>
-          </a:p>
-        </p:txBody>
-      </p:sp>
+              <a:t>This is because we can’t have something </a:t>
+            </a:r>
+            <a:r>
+              <a:rPr lang="en-US" sz="2000" i="1" dirty="0">
+                <a:latin typeface="+mj-lt"/>
+              </a:rPr>
+              <a:t>behind</a:t>
+            </a:r>
+            <a:r>
+              <a:rPr lang="en-US" sz="2000" dirty="0">
+                <a:latin typeface="+mj-lt"/>
+              </a:rPr>
+              <a:t> our light source casting a shadow.</a:t>
+            </a:r>
+          </a:p>
+          <a:p>
+            <a:pPr marL="0" indent="0">
+              <a:buNone/>
+            </a:pPr>
+            <a:r>
+              <a:rPr lang="en-US" sz="1600" b="1" dirty="0">
+                <a:latin typeface="+mj-lt"/>
+              </a:rPr>
+              <a:t>Edge Case</a:t>
+            </a:r>
+            <a:r>
+              <a:rPr lang="en-US" sz="1600" dirty="0">
+                <a:latin typeface="+mj-lt"/>
+              </a:rPr>
+              <a:t>: Our math here breaks when we realize that there’s an intersection at t=0, P+0L = P</a:t>
+            </a:r>
+          </a:p>
+          <a:p>
+            <a:pPr marL="0" indent="0">
+              <a:buNone/>
+            </a:pPr>
+            <a:r>
+              <a:rPr lang="en-US" sz="1600" dirty="0">
+                <a:latin typeface="+mj-lt"/>
+              </a:rPr>
+              <a:t>This means we cannot have the ray start at exactly t=0, because there’s an intersection of the ray/sphere at this point creating a false shadow. </a:t>
+            </a:r>
+          </a:p>
+          <a:p>
+            <a:pPr marL="0" indent="0">
+              <a:buNone/>
+            </a:pPr>
+            <a:r>
+              <a:rPr lang="en-US" sz="1600" b="1" dirty="0">
+                <a:latin typeface="+mj-lt"/>
+              </a:rPr>
+              <a:t>Solution</a:t>
+            </a:r>
+            <a:r>
+              <a:rPr lang="en-US" sz="1600" dirty="0">
+                <a:latin typeface="+mj-lt"/>
+              </a:rPr>
+              <a:t>: Set the starting point of the ray to a tiny number greater than zero, so the range of the ray will actually be                for directional lights, and          for point lights.</a:t>
+            </a:r>
+          </a:p>
+          <a:p>
+            <a:pPr marL="0" indent="0">
+              <a:buNone/>
+            </a:pPr>
+            <a:endParaRPr lang="en-US" sz="2000" dirty="0">
+              <a:latin typeface="+mj-lt"/>
+            </a:endParaRPr>
+          </a:p>
+        </p:txBody>
+      </p:sp>
+      <p:pic>
+        <p:nvPicPr>
+          <p:cNvPr id="9" name="Picture 8">
+            <a:extLst>
+              <a:ext uri="{FF2B5EF4-FFF2-40B4-BE49-F238E27FC236}">
+                <a16:creationId xmlns:a16="http://schemas.microsoft.com/office/drawing/2014/main" id="{F70E274A-53E2-44FF-B2A9-027770E5E703}"/>
+              </a:ext>
+            </a:extLst>
+          </p:cNvPr>
+          <p:cNvPicPr>
+            <a:picLocks noChangeAspect="1"/>
+          </p:cNvPicPr>
+          <p:nvPr/>
+        </p:nvPicPr>
+        <p:blipFill>
+          <a:blip r:embed="rId3">
+            <a:extLst>
+              <a:ext uri="{28A0092B-C50C-407E-A947-70E740481C1C}">
+                <a14:useLocalDpi xmlns:a14="http://schemas.microsoft.com/office/drawing/2010/main" val="0"/>
+              </a:ext>
+            </a:extLst>
+          </a:blip>
+          <a:stretch>
+            <a:fillRect/>
+          </a:stretch>
+        </p:blipFill>
+        <p:spPr>
+          <a:xfrm>
+            <a:off x="4137204" y="2050566"/>
+            <a:ext cx="695422" cy="219106"/>
+          </a:xfrm>
+          <a:prstGeom prst="rect">
+            <a:avLst/>
+          </a:prstGeom>
+        </p:spPr>
+      </p:pic>
+      <p:pic>
+        <p:nvPicPr>
+          <p:cNvPr id="12" name="Picture 11" descr="Diagram&#10;&#10;Description automatically generated">
+            <a:extLst>
+              <a:ext uri="{FF2B5EF4-FFF2-40B4-BE49-F238E27FC236}">
+                <a16:creationId xmlns:a16="http://schemas.microsoft.com/office/drawing/2014/main" id="{2A13754F-8B3B-46F6-903D-69249E39AA06}"/>
+              </a:ext>
+            </a:extLst>
+          </p:cNvPr>
+          <p:cNvPicPr>
+            <a:picLocks noChangeAspect="1"/>
+          </p:cNvPicPr>
+          <p:nvPr/>
+        </p:nvPicPr>
+        <p:blipFill>
+          <a:blip r:embed="rId4">
+            <a:extLst>
+              <a:ext uri="{28A0092B-C50C-407E-A947-70E740481C1C}">
+                <a14:useLocalDpi xmlns:a14="http://schemas.microsoft.com/office/drawing/2010/main" val="0"/>
+              </a:ext>
+            </a:extLst>
+          </a:blip>
+          <a:stretch>
+            <a:fillRect/>
+          </a:stretch>
+        </p:blipFill>
+        <p:spPr>
+          <a:xfrm>
+            <a:off x="5917195" y="911243"/>
+            <a:ext cx="5811061" cy="4848902"/>
+          </a:xfrm>
+          <a:prstGeom prst="rect">
+            <a:avLst/>
+          </a:prstGeom>
+        </p:spPr>
+      </p:pic>
+      <p:pic>
+        <p:nvPicPr>
+          <p:cNvPr id="16" name="Picture 15">
+            <a:extLst>
+              <a:ext uri="{FF2B5EF4-FFF2-40B4-BE49-F238E27FC236}">
+                <a16:creationId xmlns:a16="http://schemas.microsoft.com/office/drawing/2014/main" id="{E8031AEB-13D7-4D50-8F50-CEF932C50B71}"/>
+              </a:ext>
+            </a:extLst>
+          </p:cNvPr>
+          <p:cNvPicPr>
+            <a:picLocks noChangeAspect="1"/>
+          </p:cNvPicPr>
+          <p:nvPr/>
+        </p:nvPicPr>
+        <p:blipFill>
+          <a:blip r:embed="rId5">
+            <a:extLst>
+              <a:ext uri="{28A0092B-C50C-407E-A947-70E740481C1C}">
+                <a14:useLocalDpi xmlns:a14="http://schemas.microsoft.com/office/drawing/2010/main" val="0"/>
+              </a:ext>
+            </a:extLst>
+          </a:blip>
+          <a:stretch>
+            <a:fillRect/>
+          </a:stretch>
+        </p:blipFill>
+        <p:spPr>
+          <a:xfrm>
+            <a:off x="1861316" y="4896516"/>
+            <a:ext cx="609685" cy="200053"/>
+          </a:xfrm>
+          <a:prstGeom prst="rect">
+            <a:avLst/>
+          </a:prstGeom>
+        </p:spPr>
+      </p:pic>
+      <p:pic>
+        <p:nvPicPr>
+          <p:cNvPr id="18" name="Picture 17">
+            <a:extLst>
+              <a:ext uri="{FF2B5EF4-FFF2-40B4-BE49-F238E27FC236}">
+                <a16:creationId xmlns:a16="http://schemas.microsoft.com/office/drawing/2014/main" id="{C2F24285-5B4B-4FCC-B7FB-A42EA1FA0DEE}"/>
+              </a:ext>
+            </a:extLst>
+          </p:cNvPr>
+          <p:cNvPicPr>
+            <a:picLocks noChangeAspect="1"/>
+          </p:cNvPicPr>
+          <p:nvPr/>
+        </p:nvPicPr>
+        <p:blipFill>
+          <a:blip r:embed="rId6">
+            <a:extLst>
+              <a:ext uri="{28A0092B-C50C-407E-A947-70E740481C1C}">
+                <a14:useLocalDpi xmlns:a14="http://schemas.microsoft.com/office/drawing/2010/main" val="0"/>
+              </a:ext>
+            </a:extLst>
+          </a:blip>
+          <a:stretch>
+            <a:fillRect/>
+          </a:stretch>
+        </p:blipFill>
+        <p:spPr>
+          <a:xfrm>
+            <a:off x="4642099" y="4896516"/>
+            <a:ext cx="381053" cy="181000"/>
+          </a:xfrm>
+          <a:prstGeom prst="rect">
+            <a:avLst/>
+          </a:prstGeom>
+        </p:spPr>
+      </p:pic>
     </p:spTree>
     <p:extLst>
       <p:ext uri="{BB962C8B-B14F-4D97-AF65-F5344CB8AC3E}">
-        <p14:creationId xmlns:p14="http://schemas.microsoft.com/office/powerpoint/2010/main" val="2531437524"/>
+        <p14:creationId xmlns:p14="http://schemas.microsoft.com/office/powerpoint/2010/main" val="1581112152"/>
       </p:ext>
     </p:extLst>
   </p:cSld>
@@ -5189,15 +5791,15 @@
           <p:cNvPr id="2" name="Title 1">
             <a:extLst>
               <a:ext uri="{FF2B5EF4-FFF2-40B4-BE49-F238E27FC236}">
-                <a16:creationId xmlns:a16="http://schemas.microsoft.com/office/drawing/2014/main" id="{CFD2A866-64A4-42F7-8809-D9FDB61CC407}"/>
-              </a:ext>
-            </a:extLst>
-          </p:cNvPr>
-          <p:cNvSpPr>
-            <a:spLocks noGrp="1"/>
-          </p:cNvSpPr>
-          <p:nvPr>
-            <p:ph type="ctrTitle"/>
+                <a16:creationId xmlns:a16="http://schemas.microsoft.com/office/drawing/2014/main" id="{90EAD578-3000-4ECC-8955-4586A64A81B9}"/>
+              </a:ext>
+            </a:extLst>
+          </p:cNvPr>
+          <p:cNvSpPr>
+            <a:spLocks noGrp="1"/>
+          </p:cNvSpPr>
+          <p:nvPr>
+            <p:ph type="title"/>
           </p:nvPr>
         </p:nvSpPr>
         <p:spPr/>
@@ -5207,104 +5809,45 @@
           <a:p>
             <a:r>
               <a:rPr lang="en-US" dirty="0"/>
-              <a:t>Sources:</a:t>
-            </a:r>
-          </a:p>
-        </p:txBody>
-      </p:sp>
-      <p:sp>
-        <p:nvSpPr>
-          <p:cNvPr id="3" name="Subtitle 2">
-            <a:extLst>
-              <a:ext uri="{FF2B5EF4-FFF2-40B4-BE49-F238E27FC236}">
-                <a16:creationId xmlns:a16="http://schemas.microsoft.com/office/drawing/2014/main" id="{F26D0D6E-5592-4855-A460-F9EDDCBAE0B7}"/>
-              </a:ext>
-            </a:extLst>
-          </p:cNvPr>
-          <p:cNvSpPr>
-            <a:spLocks noGrp="1"/>
-          </p:cNvSpPr>
-          <p:nvPr>
-            <p:ph type="subTitle" idx="1"/>
+              <a:t>Recap/Summary and </a:t>
+            </a:r>
+            <a:r>
+              <a:rPr lang="en-US" dirty="0" err="1"/>
+              <a:t>PseudoCode</a:t>
+            </a:r>
+            <a:endParaRPr lang="en-US" dirty="0"/>
+          </a:p>
+        </p:txBody>
+      </p:sp>
+      <p:sp>
+        <p:nvSpPr>
+          <p:cNvPr id="4" name="Date Placeholder 3">
+            <a:extLst>
+              <a:ext uri="{FF2B5EF4-FFF2-40B4-BE49-F238E27FC236}">
+                <a16:creationId xmlns:a16="http://schemas.microsoft.com/office/drawing/2014/main" id="{2787BEE0-6464-4517-8DFF-11DC1B991D1F}"/>
+              </a:ext>
+            </a:extLst>
+          </p:cNvPr>
+          <p:cNvSpPr>
+            <a:spLocks noGrp="1"/>
+          </p:cNvSpPr>
+          <p:nvPr>
+            <p:ph type="dt" sz="half" idx="10"/>
           </p:nvPr>
         </p:nvSpPr>
         <p:spPr>
           <a:xfrm>
-            <a:off x="1088571" y="3577156"/>
-            <a:ext cx="10014857" cy="1655762"/>
+            <a:off x="794559" y="6367884"/>
+            <a:ext cx="2743200" cy="365125"/>
           </a:xfrm>
         </p:spPr>
         <p:txBody>
-          <a:bodyPr>
-            <a:normAutofit fontScale="92500"/>
-          </a:bodyPr>
-          <a:lstStyle/>
-          <a:p>
-            <a:r>
-              <a:rPr lang="en-US" dirty="0" err="1"/>
-              <a:t>Github</a:t>
-            </a:r>
-            <a:r>
-              <a:rPr lang="en-US" dirty="0"/>
-              <a:t> for this Demo: </a:t>
-            </a:r>
-            <a:r>
-              <a:rPr lang="en-US" dirty="0">
-                <a:hlinkClick r:id="rId2"/>
-              </a:rPr>
-              <a:t>https://github.com/ctrachte/JS-Computer-Graphics-Demo</a:t>
-            </a:r>
-            <a:endParaRPr lang="en-US" dirty="0"/>
-          </a:p>
-          <a:p>
-            <a:br>
-              <a:rPr lang="en-US" dirty="0"/>
-            </a:br>
-            <a:r>
-              <a:rPr lang="en-US" dirty="0"/>
-              <a:t>Gambetta, Gabriel. </a:t>
-            </a:r>
-            <a:r>
-              <a:rPr lang="en-US" i="1" dirty="0"/>
-              <a:t>“Computer Graphics from Scratch”. Web, 2021. </a:t>
-            </a:r>
-            <a:r>
-              <a:rPr lang="en-US" i="1" dirty="0">
-                <a:hlinkClick r:id="rId3"/>
-              </a:rPr>
-              <a:t>https://gabrielgambetta.com/computer-graphics-from-scratch/</a:t>
-            </a:r>
-            <a:endParaRPr lang="en-US" i="1" dirty="0"/>
-          </a:p>
-          <a:p>
-            <a:endParaRPr lang="en-US" i="1" dirty="0"/>
-          </a:p>
-        </p:txBody>
-      </p:sp>
-      <p:sp>
-        <p:nvSpPr>
-          <p:cNvPr id="4" name="Date Placeholder 3">
-            <a:extLst>
-              <a:ext uri="{FF2B5EF4-FFF2-40B4-BE49-F238E27FC236}">
-                <a16:creationId xmlns:a16="http://schemas.microsoft.com/office/drawing/2014/main" id="{C5B7EC2F-572A-4A58-A93B-226C493EA37E}"/>
-              </a:ext>
-            </a:extLst>
-          </p:cNvPr>
-          <p:cNvSpPr>
-            <a:spLocks noGrp="1"/>
-          </p:cNvSpPr>
-          <p:nvPr>
-            <p:ph type="dt" sz="half" idx="10"/>
-          </p:nvPr>
-        </p:nvSpPr>
-        <p:spPr/>
-        <p:txBody>
-          <a:bodyPr/>
-          <a:lstStyle/>
-          <a:p>
-            <a:fld id="{8FA5496C-C728-456A-977F-D9196E097204}" type="datetime1">
+          <a:bodyPr/>
+          <a:lstStyle/>
+          <a:p>
+            <a:fld id="{82BCD581-7540-41CB-8BBB-BEC98AE789ED}" type="datetime1">
               <a:rPr lang="en-US" smtClean="0"/>
-              <a:t>4/7/2021</a:t>
+              <a:t>4/14/2021</a:t>
             </a:fld>
             <a:endParaRPr lang="en-US" dirty="0"/>
           </a:p>
@@ -5315,7 +5858,7 @@
           <p:cNvPr id="5" name="Footer Placeholder 4">
             <a:extLst>
               <a:ext uri="{FF2B5EF4-FFF2-40B4-BE49-F238E27FC236}">
-                <a16:creationId xmlns:a16="http://schemas.microsoft.com/office/drawing/2014/main" id="{B13EE22C-5F84-4EBE-8293-449C3CCF7746}"/>
+                <a16:creationId xmlns:a16="http://schemas.microsoft.com/office/drawing/2014/main" id="{7270B72A-09EF-4DFB-A21A-DEB33EA22253}"/>
               </a:ext>
             </a:extLst>
           </p:cNvPr>
@@ -5332,16 +5875,1268 @@
           <a:lstStyle/>
           <a:p>
             <a:r>
-              <a:rPr lang="en-US"/>
+              <a:rPr lang="en-US" dirty="0"/>
               <a:t>Gambetta, Gabriel. 2021, Computer Graphics from Scratch</a:t>
             </a:r>
           </a:p>
         </p:txBody>
       </p:sp>
+      <p:pic>
+        <p:nvPicPr>
+          <p:cNvPr id="9" name="Content Placeholder 8" descr="Text&#10;&#10;Description automatically generated">
+            <a:extLst>
+              <a:ext uri="{FF2B5EF4-FFF2-40B4-BE49-F238E27FC236}">
+                <a16:creationId xmlns:a16="http://schemas.microsoft.com/office/drawing/2014/main" id="{E7A3010A-BE4D-4E90-B6A4-E1AE33DBAE4D}"/>
+              </a:ext>
+            </a:extLst>
+          </p:cNvPr>
+          <p:cNvPicPr>
+            <a:picLocks noGrp="1" noChangeAspect="1"/>
+          </p:cNvPicPr>
+          <p:nvPr>
+            <p:ph idx="1"/>
+          </p:nvPr>
+        </p:nvPicPr>
+        <p:blipFill>
+          <a:blip r:embed="rId3">
+            <a:extLst>
+              <a:ext uri="{28A0092B-C50C-407E-A947-70E740481C1C}">
+                <a14:useLocalDpi xmlns:a14="http://schemas.microsoft.com/office/drawing/2010/main" val="0"/>
+              </a:ext>
+            </a:extLst>
+          </a:blip>
+          <a:stretch>
+            <a:fillRect/>
+          </a:stretch>
+        </p:blipFill>
+        <p:spPr>
+          <a:xfrm>
+            <a:off x="794559" y="1393533"/>
+            <a:ext cx="6290105" cy="1524681"/>
+          </a:xfrm>
+        </p:spPr>
+      </p:pic>
+      <p:pic>
+        <p:nvPicPr>
+          <p:cNvPr id="11" name="Picture 10" descr="Text&#10;&#10;Description automatically generated">
+            <a:extLst>
+              <a:ext uri="{FF2B5EF4-FFF2-40B4-BE49-F238E27FC236}">
+                <a16:creationId xmlns:a16="http://schemas.microsoft.com/office/drawing/2014/main" id="{C5902DB0-36CA-46C7-AF50-FF8DCEF9020D}"/>
+              </a:ext>
+            </a:extLst>
+          </p:cNvPr>
+          <p:cNvPicPr>
+            <a:picLocks noChangeAspect="1"/>
+          </p:cNvPicPr>
+          <p:nvPr/>
+        </p:nvPicPr>
+        <p:blipFill>
+          <a:blip r:embed="rId4">
+            <a:extLst>
+              <a:ext uri="{28A0092B-C50C-407E-A947-70E740481C1C}">
+                <a14:useLocalDpi xmlns:a14="http://schemas.microsoft.com/office/drawing/2010/main" val="0"/>
+              </a:ext>
+            </a:extLst>
+          </a:blip>
+          <a:stretch>
+            <a:fillRect/>
+          </a:stretch>
+        </p:blipFill>
+        <p:spPr>
+          <a:xfrm>
+            <a:off x="5551415" y="1393533"/>
+            <a:ext cx="6519981" cy="4285862"/>
+          </a:xfrm>
+          <a:prstGeom prst="rect">
+            <a:avLst/>
+          </a:prstGeom>
+        </p:spPr>
+      </p:pic>
     </p:spTree>
     <p:extLst>
       <p:ext uri="{BB962C8B-B14F-4D97-AF65-F5344CB8AC3E}">
-        <p14:creationId xmlns:p14="http://schemas.microsoft.com/office/powerpoint/2010/main" val="3385567051"/>
+        <p14:creationId xmlns:p14="http://schemas.microsoft.com/office/powerpoint/2010/main" val="2531437524"/>
+      </p:ext>
+    </p:extLst>
+  </p:cSld>
+  <p:clrMapOvr>
+    <a:masterClrMapping/>
+  </p:clrMapOvr>
+</p:sld>
+</file>
+
+<file path=ppt/slides/slide6.xml><?xml version="1.0" encoding="utf-8"?>
+<p:sld xmlns:a="http://schemas.openxmlformats.org/drawingml/2006/main" xmlns:r="http://schemas.openxmlformats.org/officeDocument/2006/relationships" xmlns:p="http://schemas.openxmlformats.org/presentationml/2006/main">
+  <p:cSld>
+    <p:spTree>
+      <p:nvGrpSpPr>
+        <p:cNvPr id="1" name=""/>
+        <p:cNvGrpSpPr/>
+        <p:nvPr/>
+      </p:nvGrpSpPr>
+      <p:grpSpPr>
+        <a:xfrm>
+          <a:off x="0" y="0"/>
+          <a:ext cx="0" cy="0"/>
+          <a:chOff x="0" y="0"/>
+          <a:chExt cx="0" cy="0"/>
+        </a:xfrm>
+      </p:grpSpPr>
+      <p:sp>
+        <p:nvSpPr>
+          <p:cNvPr id="2" name="Title 1">
+            <a:extLst>
+              <a:ext uri="{FF2B5EF4-FFF2-40B4-BE49-F238E27FC236}">
+                <a16:creationId xmlns:a16="http://schemas.microsoft.com/office/drawing/2014/main" id="{FF06EC0C-E863-4815-86CB-F4394DA180AC}"/>
+              </a:ext>
+            </a:extLst>
+          </p:cNvPr>
+          <p:cNvSpPr>
+            <a:spLocks noGrp="1"/>
+          </p:cNvSpPr>
+          <p:nvPr>
+            <p:ph type="title"/>
+          </p:nvPr>
+        </p:nvSpPr>
+        <p:spPr/>
+        <p:txBody>
+          <a:bodyPr/>
+          <a:lstStyle/>
+          <a:p>
+            <a:r>
+              <a:rPr lang="en-US" dirty="0"/>
+              <a:t>Basic Concepts: Reflections</a:t>
+            </a:r>
+          </a:p>
+        </p:txBody>
+      </p:sp>
+      <p:sp>
+        <p:nvSpPr>
+          <p:cNvPr id="3" name="Content Placeholder 2">
+            <a:extLst>
+              <a:ext uri="{FF2B5EF4-FFF2-40B4-BE49-F238E27FC236}">
+                <a16:creationId xmlns:a16="http://schemas.microsoft.com/office/drawing/2014/main" id="{E3D788FC-2FFF-42F1-B2A5-6BF3003378F2}"/>
+              </a:ext>
+            </a:extLst>
+          </p:cNvPr>
+          <p:cNvSpPr>
+            <a:spLocks noGrp="1"/>
+          </p:cNvSpPr>
+          <p:nvPr>
+            <p:ph idx="1"/>
+          </p:nvPr>
+        </p:nvSpPr>
+        <p:spPr>
+          <a:xfrm>
+            <a:off x="838200" y="1825625"/>
+            <a:ext cx="5891521" cy="4351338"/>
+          </a:xfrm>
+        </p:spPr>
+        <p:txBody>
+          <a:bodyPr>
+            <a:normAutofit/>
+          </a:bodyPr>
+          <a:lstStyle/>
+          <a:p>
+            <a:pPr marL="0" indent="0">
+              <a:buNone/>
+            </a:pPr>
+            <a:r>
+              <a:rPr lang="es-ES" b="1" i="1" dirty="0" err="1"/>
+              <a:t>What</a:t>
+            </a:r>
+            <a:r>
+              <a:rPr lang="es-ES" b="1" i="1" dirty="0"/>
+              <a:t> are </a:t>
+            </a:r>
+            <a:r>
+              <a:rPr lang="es-ES" b="1" i="1" dirty="0" err="1"/>
+              <a:t>reflections</a:t>
+            </a:r>
+            <a:r>
+              <a:rPr lang="es-ES" b="1" i="1" dirty="0"/>
+              <a:t>?</a:t>
+            </a:r>
+          </a:p>
+          <a:p>
+            <a:pPr>
+              <a:buFontTx/>
+              <a:buChar char="-"/>
+            </a:pPr>
+            <a:r>
+              <a:rPr lang="en-US" dirty="0"/>
+              <a:t>Reflections occur when rays of light reflect off an object.</a:t>
+            </a:r>
+          </a:p>
+          <a:p>
+            <a:pPr>
+              <a:buFontTx/>
+              <a:buChar char="-"/>
+            </a:pPr>
+            <a:r>
+              <a:rPr lang="en-US" dirty="0"/>
+              <a:t>Rays of light are reflected symmetrically, as noted in Figure 4-5</a:t>
+            </a:r>
+          </a:p>
+          <a:p>
+            <a:pPr>
+              <a:buFontTx/>
+              <a:buChar char="-"/>
+            </a:pPr>
+            <a:r>
+              <a:rPr lang="en-US" dirty="0"/>
+              <a:t>What we need is a method that can, given a ray of light, return the color of the light … </a:t>
+            </a:r>
+          </a:p>
+          <a:p>
+            <a:pPr>
+              <a:buFontTx/>
+              <a:buChar char="-"/>
+            </a:pPr>
+            <a:r>
+              <a:rPr lang="en-US" i="1" dirty="0"/>
+              <a:t>We already do -`</a:t>
+            </a:r>
+            <a:r>
+              <a:rPr lang="en-US" i="1" dirty="0" err="1"/>
+              <a:t>TraceRay</a:t>
+            </a:r>
+            <a:r>
+              <a:rPr lang="en-US" i="1" dirty="0"/>
+              <a:t>()`!</a:t>
+            </a:r>
+          </a:p>
+        </p:txBody>
+      </p:sp>
+      <p:sp>
+        <p:nvSpPr>
+          <p:cNvPr id="4" name="Date Placeholder 3">
+            <a:extLst>
+              <a:ext uri="{FF2B5EF4-FFF2-40B4-BE49-F238E27FC236}">
+                <a16:creationId xmlns:a16="http://schemas.microsoft.com/office/drawing/2014/main" id="{F84D8F5A-8591-40A7-986C-D0ACAD96CDB0}"/>
+              </a:ext>
+            </a:extLst>
+          </p:cNvPr>
+          <p:cNvSpPr>
+            <a:spLocks noGrp="1"/>
+          </p:cNvSpPr>
+          <p:nvPr>
+            <p:ph type="dt" sz="half" idx="10"/>
+          </p:nvPr>
+        </p:nvSpPr>
+        <p:spPr/>
+        <p:txBody>
+          <a:bodyPr/>
+          <a:lstStyle/>
+          <a:p>
+            <a:fld id="{82BCD581-7540-41CB-8BBB-BEC98AE789ED}" type="datetime1">
+              <a:rPr lang="en-US" smtClean="0"/>
+              <a:t>4/14/2021</a:t>
+            </a:fld>
+            <a:endParaRPr lang="en-US"/>
+          </a:p>
+        </p:txBody>
+      </p:sp>
+      <p:sp>
+        <p:nvSpPr>
+          <p:cNvPr id="5" name="Footer Placeholder 4">
+            <a:extLst>
+              <a:ext uri="{FF2B5EF4-FFF2-40B4-BE49-F238E27FC236}">
+                <a16:creationId xmlns:a16="http://schemas.microsoft.com/office/drawing/2014/main" id="{20BDA9B8-8AEB-4FB7-97BD-612DF14906DE}"/>
+              </a:ext>
+            </a:extLst>
+          </p:cNvPr>
+          <p:cNvSpPr>
+            <a:spLocks noGrp="1"/>
+          </p:cNvSpPr>
+          <p:nvPr>
+            <p:ph type="ftr" sz="quarter" idx="11"/>
+          </p:nvPr>
+        </p:nvSpPr>
+        <p:spPr/>
+        <p:txBody>
+          <a:bodyPr/>
+          <a:lstStyle/>
+          <a:p>
+            <a:r>
+              <a:rPr lang="en-US" dirty="0"/>
+              <a:t>Gambetta, Gabriel. 2021, Computer Graphics from Scratch</a:t>
+            </a:r>
+          </a:p>
+        </p:txBody>
+      </p:sp>
+      <p:pic>
+        <p:nvPicPr>
+          <p:cNvPr id="8" name="Picture 7" descr="Diagram&#10;&#10;Description automatically generated">
+            <a:extLst>
+              <a:ext uri="{FF2B5EF4-FFF2-40B4-BE49-F238E27FC236}">
+                <a16:creationId xmlns:a16="http://schemas.microsoft.com/office/drawing/2014/main" id="{0AC5C31E-80EE-41F9-A471-A562BCB60FE9}"/>
+              </a:ext>
+            </a:extLst>
+          </p:cNvPr>
+          <p:cNvPicPr>
+            <a:picLocks noChangeAspect="1"/>
+          </p:cNvPicPr>
+          <p:nvPr/>
+        </p:nvPicPr>
+        <p:blipFill>
+          <a:blip r:embed="rId2">
+            <a:extLst>
+              <a:ext uri="{28A0092B-C50C-407E-A947-70E740481C1C}">
+                <a14:useLocalDpi xmlns:a14="http://schemas.microsoft.com/office/drawing/2010/main" val="0"/>
+              </a:ext>
+            </a:extLst>
+          </a:blip>
+          <a:stretch>
+            <a:fillRect/>
+          </a:stretch>
+        </p:blipFill>
+        <p:spPr>
+          <a:xfrm>
+            <a:off x="6695308" y="1807506"/>
+            <a:ext cx="5496692" cy="3219899"/>
+          </a:xfrm>
+          <a:prstGeom prst="rect">
+            <a:avLst/>
+          </a:prstGeom>
+        </p:spPr>
+      </p:pic>
+    </p:spTree>
+    <p:extLst>
+      <p:ext uri="{BB962C8B-B14F-4D97-AF65-F5344CB8AC3E}">
+        <p14:creationId xmlns:p14="http://schemas.microsoft.com/office/powerpoint/2010/main" val="2156554642"/>
+      </p:ext>
+    </p:extLst>
+  </p:cSld>
+  <p:clrMapOvr>
+    <a:masterClrMapping/>
+  </p:clrMapOvr>
+</p:sld>
+</file>
+
+<file path=ppt/slides/slide7.xml><?xml version="1.0" encoding="utf-8"?>
+<p:sld xmlns:a="http://schemas.openxmlformats.org/drawingml/2006/main" xmlns:r="http://schemas.openxmlformats.org/officeDocument/2006/relationships" xmlns:p="http://schemas.openxmlformats.org/presentationml/2006/main">
+  <p:cSld>
+    <p:spTree>
+      <p:nvGrpSpPr>
+        <p:cNvPr id="1" name=""/>
+        <p:cNvGrpSpPr/>
+        <p:nvPr/>
+      </p:nvGrpSpPr>
+      <p:grpSpPr>
+        <a:xfrm>
+          <a:off x="0" y="0"/>
+          <a:ext cx="0" cy="0"/>
+          <a:chOff x="0" y="0"/>
+          <a:chExt cx="0" cy="0"/>
+        </a:xfrm>
+      </p:grpSpPr>
+      <p:sp>
+        <p:nvSpPr>
+          <p:cNvPr id="2" name="Title 1">
+            <a:extLst>
+              <a:ext uri="{FF2B5EF4-FFF2-40B4-BE49-F238E27FC236}">
+                <a16:creationId xmlns:a16="http://schemas.microsoft.com/office/drawing/2014/main" id="{DE808610-CA94-4058-B29C-7C1B4226F924}"/>
+              </a:ext>
+            </a:extLst>
+          </p:cNvPr>
+          <p:cNvSpPr>
+            <a:spLocks noGrp="1"/>
+          </p:cNvSpPr>
+          <p:nvPr>
+            <p:ph type="title"/>
+          </p:nvPr>
+        </p:nvSpPr>
+        <p:spPr/>
+        <p:txBody>
+          <a:bodyPr/>
+          <a:lstStyle/>
+          <a:p>
+            <a:r>
+              <a:rPr lang="en-US" dirty="0"/>
+              <a:t>Adding Reflections</a:t>
+            </a:r>
+          </a:p>
+        </p:txBody>
+      </p:sp>
+      <p:sp>
+        <p:nvSpPr>
+          <p:cNvPr id="3" name="Content Placeholder 2">
+            <a:extLst>
+              <a:ext uri="{FF2B5EF4-FFF2-40B4-BE49-F238E27FC236}">
+                <a16:creationId xmlns:a16="http://schemas.microsoft.com/office/drawing/2014/main" id="{81164BF3-36B0-4DD7-8B03-445E6BF227A8}"/>
+              </a:ext>
+            </a:extLst>
+          </p:cNvPr>
+          <p:cNvSpPr>
+            <a:spLocks noGrp="1"/>
+          </p:cNvSpPr>
+          <p:nvPr>
+            <p:ph idx="1"/>
+          </p:nvPr>
+        </p:nvSpPr>
+        <p:spPr/>
+        <p:txBody>
+          <a:bodyPr>
+            <a:normAutofit/>
+          </a:bodyPr>
+          <a:lstStyle/>
+          <a:p>
+            <a:pPr marL="0" indent="0">
+              <a:buNone/>
+            </a:pPr>
+            <a:r>
+              <a:rPr lang="en-US" dirty="0"/>
+              <a:t>We will need to integrate into the main loop logic that computes:</a:t>
+            </a:r>
+          </a:p>
+          <a:p>
+            <a:pPr marL="914400" lvl="1" indent="-457200">
+              <a:buFont typeface="+mj-lt"/>
+              <a:buAutoNum type="arabicPeriod"/>
+            </a:pPr>
+            <a:r>
+              <a:rPr lang="en-US" dirty="0"/>
+              <a:t>the direction of the reflected ray,</a:t>
+            </a:r>
+          </a:p>
+          <a:p>
+            <a:pPr marL="914400" lvl="1" indent="-457200">
+              <a:buFont typeface="+mj-lt"/>
+              <a:buAutoNum type="arabicPeriod"/>
+            </a:pPr>
+            <a:r>
+              <a:rPr lang="en-US" dirty="0"/>
+              <a:t>and the color of the light from that direction.</a:t>
+            </a:r>
+          </a:p>
+          <a:p>
+            <a:pPr marL="0" indent="0">
+              <a:buNone/>
+            </a:pPr>
+            <a:r>
+              <a:rPr lang="en-US" dirty="0"/>
+              <a:t>This is a simple exercise of recursion: we are simply going to call the same method within itself!</a:t>
+            </a:r>
+          </a:p>
+          <a:p>
+            <a:pPr marL="0" indent="0">
+              <a:buNone/>
+            </a:pPr>
+            <a:r>
+              <a:rPr lang="en-US" dirty="0" err="1"/>
+              <a:t>Calling`RayTrace</a:t>
+            </a:r>
+            <a:r>
+              <a:rPr lang="en-US" dirty="0"/>
+              <a:t>()` recursively has three outcomes: </a:t>
+            </a:r>
+          </a:p>
+          <a:p>
+            <a:pPr marL="914400" lvl="1" indent="-457200">
+              <a:buFont typeface="+mj-lt"/>
+              <a:buAutoNum type="arabicPeriod"/>
+            </a:pPr>
+            <a:r>
+              <a:rPr lang="en-US" sz="1800" dirty="0"/>
+              <a:t>the ray hits a non-reflective surface and stops.</a:t>
+            </a:r>
+          </a:p>
+          <a:p>
+            <a:pPr marL="914400" lvl="1" indent="-457200">
+              <a:buFont typeface="+mj-lt"/>
+              <a:buAutoNum type="arabicPeriod"/>
+            </a:pPr>
+            <a:r>
+              <a:rPr lang="en-US" sz="1800" dirty="0"/>
+              <a:t>the ray hits nothing, and continues infinitely (method stops)</a:t>
+            </a:r>
+          </a:p>
+          <a:p>
+            <a:pPr marL="914400" lvl="1" indent="-457200">
+              <a:buFont typeface="+mj-lt"/>
+              <a:buAutoNum type="arabicPeriod"/>
+            </a:pPr>
+            <a:r>
+              <a:rPr lang="en-US" sz="1800" dirty="0"/>
+              <a:t>the ray hits another reflective surface (could loop infinitely!)</a:t>
+            </a:r>
+          </a:p>
+          <a:p>
+            <a:pPr marL="457200" lvl="1" indent="0">
+              <a:buNone/>
+            </a:pPr>
+            <a:r>
+              <a:rPr lang="en-US" dirty="0"/>
+              <a:t> </a:t>
+            </a:r>
+          </a:p>
+        </p:txBody>
+      </p:sp>
+      <p:sp>
+        <p:nvSpPr>
+          <p:cNvPr id="4" name="Date Placeholder 3">
+            <a:extLst>
+              <a:ext uri="{FF2B5EF4-FFF2-40B4-BE49-F238E27FC236}">
+                <a16:creationId xmlns:a16="http://schemas.microsoft.com/office/drawing/2014/main" id="{4352DC5D-F1F2-4917-97D3-8FD3D37D4AF9}"/>
+              </a:ext>
+            </a:extLst>
+          </p:cNvPr>
+          <p:cNvSpPr>
+            <a:spLocks noGrp="1"/>
+          </p:cNvSpPr>
+          <p:nvPr>
+            <p:ph type="dt" sz="half" idx="10"/>
+          </p:nvPr>
+        </p:nvSpPr>
+        <p:spPr/>
+        <p:txBody>
+          <a:bodyPr/>
+          <a:lstStyle/>
+          <a:p>
+            <a:fld id="{82BCD581-7540-41CB-8BBB-BEC98AE789ED}" type="datetime1">
+              <a:rPr lang="en-US" smtClean="0"/>
+              <a:t>4/14/2021</a:t>
+            </a:fld>
+            <a:endParaRPr lang="en-US"/>
+          </a:p>
+        </p:txBody>
+      </p:sp>
+      <p:sp>
+        <p:nvSpPr>
+          <p:cNvPr id="5" name="Footer Placeholder 4">
+            <a:extLst>
+              <a:ext uri="{FF2B5EF4-FFF2-40B4-BE49-F238E27FC236}">
+                <a16:creationId xmlns:a16="http://schemas.microsoft.com/office/drawing/2014/main" id="{D7E90C11-C5C0-4E2C-8040-240F33F1A779}"/>
+              </a:ext>
+            </a:extLst>
+          </p:cNvPr>
+          <p:cNvSpPr>
+            <a:spLocks noGrp="1"/>
+          </p:cNvSpPr>
+          <p:nvPr>
+            <p:ph type="ftr" sz="quarter" idx="11"/>
+          </p:nvPr>
+        </p:nvSpPr>
+        <p:spPr/>
+        <p:txBody>
+          <a:bodyPr/>
+          <a:lstStyle/>
+          <a:p>
+            <a:r>
+              <a:rPr lang="en-US"/>
+              <a:t>Gambetta, Gabriel. 2021, Computer Graphics from Scratch</a:t>
+            </a:r>
+          </a:p>
+        </p:txBody>
+      </p:sp>
+    </p:spTree>
+    <p:extLst>
+      <p:ext uri="{BB962C8B-B14F-4D97-AF65-F5344CB8AC3E}">
+        <p14:creationId xmlns:p14="http://schemas.microsoft.com/office/powerpoint/2010/main" val="2709878217"/>
+      </p:ext>
+    </p:extLst>
+  </p:cSld>
+  <p:clrMapOvr>
+    <a:masterClrMapping/>
+  </p:clrMapOvr>
+</p:sld>
+</file>
+
+<file path=ppt/slides/slide8.xml><?xml version="1.0" encoding="utf-8"?>
+<p:sld xmlns:a="http://schemas.openxmlformats.org/drawingml/2006/main" xmlns:r="http://schemas.openxmlformats.org/officeDocument/2006/relationships" xmlns:p="http://schemas.openxmlformats.org/presentationml/2006/main">
+  <p:cSld>
+    <p:spTree>
+      <p:nvGrpSpPr>
+        <p:cNvPr id="1" name=""/>
+        <p:cNvGrpSpPr/>
+        <p:nvPr/>
+      </p:nvGrpSpPr>
+      <p:grpSpPr>
+        <a:xfrm>
+          <a:off x="0" y="0"/>
+          <a:ext cx="0" cy="0"/>
+          <a:chOff x="0" y="0"/>
+          <a:chExt cx="0" cy="0"/>
+        </a:xfrm>
+      </p:grpSpPr>
+      <p:sp>
+        <p:nvSpPr>
+          <p:cNvPr id="2" name="Title 1">
+            <a:extLst>
+              <a:ext uri="{FF2B5EF4-FFF2-40B4-BE49-F238E27FC236}">
+                <a16:creationId xmlns:a16="http://schemas.microsoft.com/office/drawing/2014/main" id="{DE808610-CA94-4058-B29C-7C1B4226F924}"/>
+              </a:ext>
+            </a:extLst>
+          </p:cNvPr>
+          <p:cNvSpPr>
+            <a:spLocks noGrp="1"/>
+          </p:cNvSpPr>
+          <p:nvPr>
+            <p:ph type="title"/>
+          </p:nvPr>
+        </p:nvSpPr>
+        <p:spPr/>
+        <p:txBody>
+          <a:bodyPr/>
+          <a:lstStyle/>
+          <a:p>
+            <a:r>
+              <a:rPr lang="en-US" dirty="0"/>
+              <a:t>Avoiding Infinite Reflections</a:t>
+            </a:r>
+          </a:p>
+        </p:txBody>
+      </p:sp>
+      <p:sp>
+        <p:nvSpPr>
+          <p:cNvPr id="3" name="Content Placeholder 2">
+            <a:extLst>
+              <a:ext uri="{FF2B5EF4-FFF2-40B4-BE49-F238E27FC236}">
+                <a16:creationId xmlns:a16="http://schemas.microsoft.com/office/drawing/2014/main" id="{81164BF3-36B0-4DD7-8B03-445E6BF227A8}"/>
+              </a:ext>
+            </a:extLst>
+          </p:cNvPr>
+          <p:cNvSpPr>
+            <a:spLocks noGrp="1"/>
+          </p:cNvSpPr>
+          <p:nvPr>
+            <p:ph idx="1"/>
+          </p:nvPr>
+        </p:nvSpPr>
+        <p:spPr>
+          <a:xfrm>
+            <a:off x="613985" y="1447253"/>
+            <a:ext cx="11385048" cy="4808652"/>
+          </a:xfrm>
+        </p:spPr>
+        <p:txBody>
+          <a:bodyPr>
+            <a:normAutofit/>
+          </a:bodyPr>
+          <a:lstStyle/>
+          <a:p>
+            <a:pPr marL="0" indent="0">
+              <a:buNone/>
+            </a:pPr>
+            <a:r>
+              <a:rPr lang="en-US" dirty="0"/>
+              <a:t>We will need to limit our raytracing recursion by setting a variable “r”</a:t>
+            </a:r>
+          </a:p>
+          <a:p>
+            <a:pPr marL="0" indent="0">
+              <a:buNone/>
+            </a:pPr>
+            <a:endParaRPr lang="en-US" dirty="0"/>
+          </a:p>
+          <a:p>
+            <a:pPr marL="0" indent="0">
+              <a:buNone/>
+            </a:pPr>
+            <a:endParaRPr lang="en-US" dirty="0"/>
+          </a:p>
+          <a:p>
+            <a:pPr marL="0" indent="0">
+              <a:buNone/>
+            </a:pPr>
+            <a:endParaRPr lang="en-US" dirty="0"/>
+          </a:p>
+          <a:p>
+            <a:pPr marL="0" indent="0">
+              <a:buNone/>
+            </a:pPr>
+            <a:endParaRPr lang="en-US" dirty="0"/>
+          </a:p>
+          <a:p>
+            <a:pPr marL="0" indent="0">
+              <a:buNone/>
+            </a:pPr>
+            <a:endParaRPr lang="en-US" dirty="0"/>
+          </a:p>
+          <a:p>
+            <a:pPr marL="0" indent="0">
+              <a:buNone/>
+            </a:pPr>
+            <a:endParaRPr lang="en-US" dirty="0"/>
+          </a:p>
+          <a:p>
+            <a:pPr marL="0" indent="0">
+              <a:buNone/>
+            </a:pPr>
+            <a:r>
+              <a:rPr lang="en-US" sz="1800" dirty="0"/>
+              <a:t>We will also assign a ‘reflectiveness’ variable to each sphere from 0.0 (not reflective at all) to 1.0 (a perfect mirror).</a:t>
+            </a:r>
+          </a:p>
+          <a:p>
+            <a:pPr marL="0" indent="0">
+              <a:buNone/>
+            </a:pPr>
+            <a:r>
+              <a:rPr lang="en-US" sz="1800" dirty="0"/>
+              <a:t>And a ‘specular’ variable to determine how shiny our object is (higher number = shinier).</a:t>
+            </a:r>
+          </a:p>
+        </p:txBody>
+      </p:sp>
+      <p:sp>
+        <p:nvSpPr>
+          <p:cNvPr id="4" name="Date Placeholder 3">
+            <a:extLst>
+              <a:ext uri="{FF2B5EF4-FFF2-40B4-BE49-F238E27FC236}">
+                <a16:creationId xmlns:a16="http://schemas.microsoft.com/office/drawing/2014/main" id="{4352DC5D-F1F2-4917-97D3-8FD3D37D4AF9}"/>
+              </a:ext>
+            </a:extLst>
+          </p:cNvPr>
+          <p:cNvSpPr>
+            <a:spLocks noGrp="1"/>
+          </p:cNvSpPr>
+          <p:nvPr>
+            <p:ph type="dt" sz="half" idx="10"/>
+          </p:nvPr>
+        </p:nvSpPr>
+        <p:spPr/>
+        <p:txBody>
+          <a:bodyPr/>
+          <a:lstStyle/>
+          <a:p>
+            <a:fld id="{82BCD581-7540-41CB-8BBB-BEC98AE789ED}" type="datetime1">
+              <a:rPr lang="en-US" smtClean="0"/>
+              <a:t>4/14/2021</a:t>
+            </a:fld>
+            <a:endParaRPr lang="en-US"/>
+          </a:p>
+        </p:txBody>
+      </p:sp>
+      <p:sp>
+        <p:nvSpPr>
+          <p:cNvPr id="5" name="Footer Placeholder 4">
+            <a:extLst>
+              <a:ext uri="{FF2B5EF4-FFF2-40B4-BE49-F238E27FC236}">
+                <a16:creationId xmlns:a16="http://schemas.microsoft.com/office/drawing/2014/main" id="{D7E90C11-C5C0-4E2C-8040-240F33F1A779}"/>
+              </a:ext>
+            </a:extLst>
+          </p:cNvPr>
+          <p:cNvSpPr>
+            <a:spLocks noGrp="1"/>
+          </p:cNvSpPr>
+          <p:nvPr>
+            <p:ph type="ftr" sz="quarter" idx="11"/>
+          </p:nvPr>
+        </p:nvSpPr>
+        <p:spPr/>
+        <p:txBody>
+          <a:bodyPr/>
+          <a:lstStyle/>
+          <a:p>
+            <a:r>
+              <a:rPr lang="en-US"/>
+              <a:t>Gambetta, Gabriel. 2021, Computer Graphics from Scratch</a:t>
+            </a:r>
+          </a:p>
+        </p:txBody>
+      </p:sp>
+      <p:pic>
+        <p:nvPicPr>
+          <p:cNvPr id="9" name="Picture 8" descr="A picture containing logo&#10;&#10;Description automatically generated">
+            <a:extLst>
+              <a:ext uri="{FF2B5EF4-FFF2-40B4-BE49-F238E27FC236}">
+                <a16:creationId xmlns:a16="http://schemas.microsoft.com/office/drawing/2014/main" id="{EB3738E9-AD7A-4A04-B813-280E83368B71}"/>
+              </a:ext>
+            </a:extLst>
+          </p:cNvPr>
+          <p:cNvPicPr>
+            <a:picLocks noChangeAspect="1"/>
+          </p:cNvPicPr>
+          <p:nvPr/>
+        </p:nvPicPr>
+        <p:blipFill>
+          <a:blip r:embed="rId2">
+            <a:extLst>
+              <a:ext uri="{28A0092B-C50C-407E-A947-70E740481C1C}">
+                <a14:useLocalDpi xmlns:a14="http://schemas.microsoft.com/office/drawing/2010/main" val="0"/>
+              </a:ext>
+            </a:extLst>
+          </a:blip>
+          <a:stretch>
+            <a:fillRect/>
+          </a:stretch>
+        </p:blipFill>
+        <p:spPr>
+          <a:xfrm>
+            <a:off x="613985" y="1791133"/>
+            <a:ext cx="4817377" cy="2927086"/>
+          </a:xfrm>
+          <a:prstGeom prst="rect">
+            <a:avLst/>
+          </a:prstGeom>
+        </p:spPr>
+      </p:pic>
+      <p:pic>
+        <p:nvPicPr>
+          <p:cNvPr id="11" name="Picture 10" descr="A picture containing chart&#10;&#10;Description automatically generated">
+            <a:extLst>
+              <a:ext uri="{FF2B5EF4-FFF2-40B4-BE49-F238E27FC236}">
+                <a16:creationId xmlns:a16="http://schemas.microsoft.com/office/drawing/2014/main" id="{C953FD84-6443-4561-B802-B019F8940E0A}"/>
+              </a:ext>
+            </a:extLst>
+          </p:cNvPr>
+          <p:cNvPicPr>
+            <a:picLocks noChangeAspect="1"/>
+          </p:cNvPicPr>
+          <p:nvPr/>
+        </p:nvPicPr>
+        <p:blipFill>
+          <a:blip r:embed="rId3">
+            <a:extLst>
+              <a:ext uri="{28A0092B-C50C-407E-A947-70E740481C1C}">
+                <a14:useLocalDpi xmlns:a14="http://schemas.microsoft.com/office/drawing/2010/main" val="0"/>
+              </a:ext>
+            </a:extLst>
+          </a:blip>
+          <a:stretch>
+            <a:fillRect/>
+          </a:stretch>
+        </p:blipFill>
+        <p:spPr>
+          <a:xfrm>
+            <a:off x="6962175" y="1859902"/>
+            <a:ext cx="4270965" cy="2726847"/>
+          </a:xfrm>
+          <a:prstGeom prst="rect">
+            <a:avLst/>
+          </a:prstGeom>
+        </p:spPr>
+      </p:pic>
+    </p:spTree>
+    <p:extLst>
+      <p:ext uri="{BB962C8B-B14F-4D97-AF65-F5344CB8AC3E}">
+        <p14:creationId xmlns:p14="http://schemas.microsoft.com/office/powerpoint/2010/main" val="3060608107"/>
+      </p:ext>
+    </p:extLst>
+  </p:cSld>
+  <p:clrMapOvr>
+    <a:masterClrMapping/>
+  </p:clrMapOvr>
+</p:sld>
+</file>
+
+<file path=ppt/slides/slide9.xml><?xml version="1.0" encoding="utf-8"?>
+<p:sld xmlns:a="http://schemas.openxmlformats.org/drawingml/2006/main" xmlns:r="http://schemas.openxmlformats.org/officeDocument/2006/relationships" xmlns:p="http://schemas.openxmlformats.org/presentationml/2006/main">
+  <p:cSld>
+    <p:spTree>
+      <p:nvGrpSpPr>
+        <p:cNvPr id="1" name=""/>
+        <p:cNvGrpSpPr/>
+        <p:nvPr/>
+      </p:nvGrpSpPr>
+      <p:grpSpPr>
+        <a:xfrm>
+          <a:off x="0" y="0"/>
+          <a:ext cx="0" cy="0"/>
+          <a:chOff x="0" y="0"/>
+          <a:chExt cx="0" cy="0"/>
+        </a:xfrm>
+      </p:grpSpPr>
+      <p:sp>
+        <p:nvSpPr>
+          <p:cNvPr id="2" name="Title 1">
+            <a:extLst>
+              <a:ext uri="{FF2B5EF4-FFF2-40B4-BE49-F238E27FC236}">
+                <a16:creationId xmlns:a16="http://schemas.microsoft.com/office/drawing/2014/main" id="{90EAD578-3000-4ECC-8955-4586A64A81B9}"/>
+              </a:ext>
+            </a:extLst>
+          </p:cNvPr>
+          <p:cNvSpPr>
+            <a:spLocks noGrp="1"/>
+          </p:cNvSpPr>
+          <p:nvPr>
+            <p:ph type="title"/>
+          </p:nvPr>
+        </p:nvSpPr>
+        <p:spPr/>
+        <p:txBody>
+          <a:bodyPr/>
+          <a:lstStyle/>
+          <a:p>
+            <a:r>
+              <a:rPr lang="en-US" dirty="0"/>
+              <a:t>Recap/Summary and </a:t>
+            </a:r>
+            <a:r>
+              <a:rPr lang="en-US" dirty="0" err="1"/>
+              <a:t>PseudoCode</a:t>
+            </a:r>
+            <a:endParaRPr lang="en-US" dirty="0"/>
+          </a:p>
+        </p:txBody>
+      </p:sp>
+      <p:sp>
+        <p:nvSpPr>
+          <p:cNvPr id="4" name="Date Placeholder 3">
+            <a:extLst>
+              <a:ext uri="{FF2B5EF4-FFF2-40B4-BE49-F238E27FC236}">
+                <a16:creationId xmlns:a16="http://schemas.microsoft.com/office/drawing/2014/main" id="{2787BEE0-6464-4517-8DFF-11DC1B991D1F}"/>
+              </a:ext>
+            </a:extLst>
+          </p:cNvPr>
+          <p:cNvSpPr>
+            <a:spLocks noGrp="1"/>
+          </p:cNvSpPr>
+          <p:nvPr>
+            <p:ph type="dt" sz="half" idx="10"/>
+          </p:nvPr>
+        </p:nvSpPr>
+        <p:spPr>
+          <a:xfrm>
+            <a:off x="794559" y="6367884"/>
+            <a:ext cx="2743200" cy="365125"/>
+          </a:xfrm>
+        </p:spPr>
+        <p:txBody>
+          <a:bodyPr/>
+          <a:lstStyle/>
+          <a:p>
+            <a:fld id="{82BCD581-7540-41CB-8BBB-BEC98AE789ED}" type="datetime1">
+              <a:rPr lang="en-US" smtClean="0"/>
+              <a:t>4/14/2021</a:t>
+            </a:fld>
+            <a:endParaRPr lang="en-US" dirty="0"/>
+          </a:p>
+        </p:txBody>
+      </p:sp>
+      <p:sp>
+        <p:nvSpPr>
+          <p:cNvPr id="5" name="Footer Placeholder 4">
+            <a:extLst>
+              <a:ext uri="{FF2B5EF4-FFF2-40B4-BE49-F238E27FC236}">
+                <a16:creationId xmlns:a16="http://schemas.microsoft.com/office/drawing/2014/main" id="{7270B72A-09EF-4DFB-A21A-DEB33EA22253}"/>
+              </a:ext>
+            </a:extLst>
+          </p:cNvPr>
+          <p:cNvSpPr>
+            <a:spLocks noGrp="1"/>
+          </p:cNvSpPr>
+          <p:nvPr>
+            <p:ph type="ftr" sz="quarter" idx="11"/>
+          </p:nvPr>
+        </p:nvSpPr>
+        <p:spPr/>
+        <p:txBody>
+          <a:bodyPr/>
+          <a:lstStyle/>
+          <a:p>
+            <a:r>
+              <a:rPr lang="en-US" dirty="0"/>
+              <a:t>Gambetta, Gabriel. 2021, Computer Graphics from Scratch</a:t>
+            </a:r>
+          </a:p>
+        </p:txBody>
+      </p:sp>
+      <p:sp>
+        <p:nvSpPr>
+          <p:cNvPr id="6" name="Content Placeholder 5">
+            <a:extLst>
+              <a:ext uri="{FF2B5EF4-FFF2-40B4-BE49-F238E27FC236}">
+                <a16:creationId xmlns:a16="http://schemas.microsoft.com/office/drawing/2014/main" id="{347F5E23-4D5A-45AD-A1B7-16241FADBB37}"/>
+              </a:ext>
+            </a:extLst>
+          </p:cNvPr>
+          <p:cNvSpPr>
+            <a:spLocks noGrp="1"/>
+          </p:cNvSpPr>
+          <p:nvPr>
+            <p:ph idx="1"/>
+          </p:nvPr>
+        </p:nvSpPr>
+        <p:spPr>
+          <a:xfrm>
+            <a:off x="838200" y="1392240"/>
+            <a:ext cx="10515600" cy="4784723"/>
+          </a:xfrm>
+        </p:spPr>
+        <p:txBody>
+          <a:bodyPr>
+            <a:normAutofit/>
+          </a:bodyPr>
+          <a:lstStyle/>
+          <a:p>
+            <a:pPr marL="0" indent="0">
+              <a:buNone/>
+            </a:pPr>
+            <a:r>
+              <a:rPr lang="en-US" sz="1800" dirty="0"/>
+              <a:t>Add new properties to sphere:</a:t>
+            </a:r>
+          </a:p>
+          <a:p>
+            <a:pPr marL="0" indent="0">
+              <a:buNone/>
+            </a:pPr>
+            <a:endParaRPr lang="en-US" sz="1800" dirty="0"/>
+          </a:p>
+          <a:p>
+            <a:pPr marL="0" indent="0">
+              <a:buNone/>
+            </a:pPr>
+            <a:endParaRPr lang="en-US" sz="1800" dirty="0"/>
+          </a:p>
+          <a:p>
+            <a:pPr marL="0" indent="0">
+              <a:buNone/>
+            </a:pPr>
+            <a:r>
+              <a:rPr lang="en-US" sz="1800" dirty="0"/>
+              <a:t>Add recursion limit to top-level `</a:t>
+            </a:r>
+            <a:r>
+              <a:rPr lang="en-US" sz="1800" dirty="0" err="1"/>
+              <a:t>TraceRay</a:t>
+            </a:r>
+            <a:r>
+              <a:rPr lang="en-US" sz="1800" dirty="0"/>
+              <a:t>()` call:</a:t>
+            </a:r>
+          </a:p>
+          <a:p>
+            <a:pPr marL="0" indent="0">
+              <a:buNone/>
+            </a:pPr>
+            <a:endParaRPr lang="en-US" sz="1800" dirty="0"/>
+          </a:p>
+          <a:p>
+            <a:pPr marL="0" indent="0">
+              <a:buNone/>
+            </a:pPr>
+            <a:r>
+              <a:rPr lang="en-US" sz="1800" dirty="0"/>
+              <a:t>Add logic to `</a:t>
+            </a:r>
+            <a:r>
+              <a:rPr lang="en-US" sz="1800" dirty="0" err="1"/>
+              <a:t>TraceRay</a:t>
+            </a:r>
+            <a:r>
+              <a:rPr lang="en-US" sz="1800" dirty="0"/>
+              <a:t>()` </a:t>
+            </a:r>
+          </a:p>
+          <a:p>
+            <a:pPr marL="0" indent="0">
+              <a:buNone/>
+            </a:pPr>
+            <a:r>
+              <a:rPr lang="en-US" sz="1800" dirty="0"/>
+              <a:t>to calculate reflections recursively:</a:t>
+            </a:r>
+          </a:p>
+          <a:p>
+            <a:pPr marL="342900" indent="-342900">
+              <a:buAutoNum type="arabicPeriod"/>
+            </a:pPr>
+            <a:r>
+              <a:rPr lang="en-US" sz="1800" dirty="0"/>
+              <a:t>Check if we need to compute reflections</a:t>
+            </a:r>
+          </a:p>
+          <a:p>
+            <a:pPr marL="342900" indent="-342900">
+              <a:buAutoNum type="arabicPeriod"/>
+            </a:pPr>
+            <a:r>
+              <a:rPr lang="en-US" sz="1800" dirty="0"/>
+              <a:t>Call `</a:t>
+            </a:r>
+            <a:r>
+              <a:rPr lang="en-US" sz="1800" dirty="0" err="1"/>
+              <a:t>TraceRay</a:t>
+            </a:r>
+            <a:r>
+              <a:rPr lang="en-US" sz="1800" dirty="0"/>
+              <a:t>()` recursively</a:t>
+            </a:r>
+          </a:p>
+          <a:p>
+            <a:pPr marL="342900" indent="-342900">
+              <a:buAutoNum type="arabicPeriod"/>
+            </a:pPr>
+            <a:r>
+              <a:rPr lang="en-US" sz="1800" dirty="0"/>
+              <a:t>Blend colors based on our new sphere</a:t>
+            </a:r>
+          </a:p>
+          <a:p>
+            <a:pPr marL="0" indent="0">
+              <a:buNone/>
+            </a:pPr>
+            <a:r>
+              <a:rPr lang="en-US" sz="1800" dirty="0"/>
+              <a:t> properties </a:t>
+            </a:r>
+          </a:p>
+          <a:p>
+            <a:pPr marL="0" indent="0">
+              <a:buNone/>
+            </a:pPr>
+            <a:endParaRPr lang="en-US" sz="1800" dirty="0"/>
+          </a:p>
+          <a:p>
+            <a:pPr marL="0" indent="0">
+              <a:buNone/>
+            </a:pPr>
+            <a:endParaRPr lang="en-US" sz="1800" dirty="0"/>
+          </a:p>
+        </p:txBody>
+      </p:sp>
+      <p:pic>
+        <p:nvPicPr>
+          <p:cNvPr id="8" name="Picture 7" descr="Text, letter&#10;&#10;Description automatically generated">
+            <a:extLst>
+              <a:ext uri="{FF2B5EF4-FFF2-40B4-BE49-F238E27FC236}">
+                <a16:creationId xmlns:a16="http://schemas.microsoft.com/office/drawing/2014/main" id="{01197039-CC15-4B39-A440-206E33395CC8}"/>
+              </a:ext>
+            </a:extLst>
+          </p:cNvPr>
+          <p:cNvPicPr>
+            <a:picLocks noChangeAspect="1"/>
+          </p:cNvPicPr>
+          <p:nvPr/>
+        </p:nvPicPr>
+        <p:blipFill>
+          <a:blip r:embed="rId3">
+            <a:extLst>
+              <a:ext uri="{28A0092B-C50C-407E-A947-70E740481C1C}">
+                <a14:useLocalDpi xmlns:a14="http://schemas.microsoft.com/office/drawing/2010/main" val="0"/>
+              </a:ext>
+            </a:extLst>
+          </a:blip>
+          <a:stretch>
+            <a:fillRect/>
+          </a:stretch>
+        </p:blipFill>
+        <p:spPr>
+          <a:xfrm>
+            <a:off x="965926" y="1753228"/>
+            <a:ext cx="1720265" cy="650418"/>
+          </a:xfrm>
+          <a:prstGeom prst="rect">
+            <a:avLst/>
+          </a:prstGeom>
+        </p:spPr>
+      </p:pic>
+      <p:pic>
+        <p:nvPicPr>
+          <p:cNvPr id="12" name="Picture 11" descr="Text&#10;&#10;Description automatically generated with low confidence">
+            <a:extLst>
+              <a:ext uri="{FF2B5EF4-FFF2-40B4-BE49-F238E27FC236}">
+                <a16:creationId xmlns:a16="http://schemas.microsoft.com/office/drawing/2014/main" id="{6B43E6C2-DD85-41DB-B84B-AAA53C1B947E}"/>
+              </a:ext>
+            </a:extLst>
+          </p:cNvPr>
+          <p:cNvPicPr>
+            <a:picLocks noChangeAspect="1"/>
+          </p:cNvPicPr>
+          <p:nvPr/>
+        </p:nvPicPr>
+        <p:blipFill>
+          <a:blip r:embed="rId4">
+            <a:extLst>
+              <a:ext uri="{28A0092B-C50C-407E-A947-70E740481C1C}">
+                <a14:useLocalDpi xmlns:a14="http://schemas.microsoft.com/office/drawing/2010/main" val="0"/>
+              </a:ext>
+            </a:extLst>
+          </a:blip>
+          <a:stretch>
+            <a:fillRect/>
+          </a:stretch>
+        </p:blipFill>
+        <p:spPr>
+          <a:xfrm>
+            <a:off x="4556453" y="1479980"/>
+            <a:ext cx="7293469" cy="992208"/>
+          </a:xfrm>
+          <a:prstGeom prst="rect">
+            <a:avLst/>
+          </a:prstGeom>
+        </p:spPr>
+      </p:pic>
+      <p:pic>
+        <p:nvPicPr>
+          <p:cNvPr id="14" name="Picture 13">
+            <a:extLst>
+              <a:ext uri="{FF2B5EF4-FFF2-40B4-BE49-F238E27FC236}">
+                <a16:creationId xmlns:a16="http://schemas.microsoft.com/office/drawing/2014/main" id="{7580ECE6-CB81-480B-A1C5-7C40B99D66A8}"/>
+              </a:ext>
+            </a:extLst>
+          </p:cNvPr>
+          <p:cNvPicPr>
+            <a:picLocks noChangeAspect="1"/>
+          </p:cNvPicPr>
+          <p:nvPr/>
+        </p:nvPicPr>
+        <p:blipFill>
+          <a:blip r:embed="rId5">
+            <a:extLst>
+              <a:ext uri="{28A0092B-C50C-407E-A947-70E740481C1C}">
+                <a14:useLocalDpi xmlns:a14="http://schemas.microsoft.com/office/drawing/2010/main" val="0"/>
+              </a:ext>
+            </a:extLst>
+          </a:blip>
+          <a:stretch>
+            <a:fillRect/>
+          </a:stretch>
+        </p:blipFill>
+        <p:spPr>
+          <a:xfrm>
+            <a:off x="931668" y="2844674"/>
+            <a:ext cx="6213863" cy="285396"/>
+          </a:xfrm>
+          <a:prstGeom prst="rect">
+            <a:avLst/>
+          </a:prstGeom>
+        </p:spPr>
+      </p:pic>
+      <p:pic>
+        <p:nvPicPr>
+          <p:cNvPr id="16" name="Picture 15" descr="Graphical user interface, text, application, email&#10;&#10;Description automatically generated">
+            <a:extLst>
+              <a:ext uri="{FF2B5EF4-FFF2-40B4-BE49-F238E27FC236}">
+                <a16:creationId xmlns:a16="http://schemas.microsoft.com/office/drawing/2014/main" id="{57FBBBAC-8ABC-455B-8EE6-C16FA103A275}"/>
+              </a:ext>
+            </a:extLst>
+          </p:cNvPr>
+          <p:cNvPicPr>
+            <a:picLocks noChangeAspect="1"/>
+          </p:cNvPicPr>
+          <p:nvPr/>
+        </p:nvPicPr>
+        <p:blipFill>
+          <a:blip r:embed="rId6">
+            <a:extLst>
+              <a:ext uri="{28A0092B-C50C-407E-A947-70E740481C1C}">
+                <a14:useLocalDpi xmlns:a14="http://schemas.microsoft.com/office/drawing/2010/main" val="0"/>
+              </a:ext>
+            </a:extLst>
+          </a:blip>
+          <a:stretch>
+            <a:fillRect/>
+          </a:stretch>
+        </p:blipFill>
+        <p:spPr>
+          <a:xfrm>
+            <a:off x="5092495" y="3130070"/>
+            <a:ext cx="6757427" cy="2965630"/>
+          </a:xfrm>
+          <a:prstGeom prst="rect">
+            <a:avLst/>
+          </a:prstGeom>
+        </p:spPr>
+      </p:pic>
+    </p:spTree>
+    <p:extLst>
+      <p:ext uri="{BB962C8B-B14F-4D97-AF65-F5344CB8AC3E}">
+        <p14:creationId xmlns:p14="http://schemas.microsoft.com/office/powerpoint/2010/main" val="1926108534"/>
       </p:ext>
     </p:extLst>
   </p:cSld>

</xml_diff>